<commit_message>
Adding updated notebook and ppt PGD
</commit_message>
<xml_diff>
--- a/PyDataGlobal2021/Getting Started with Text Classification.pptx
+++ b/PyDataGlobal2021/Getting Started with Text Classification.pptx
@@ -10,13 +10,15 @@
     <p:sldId id="260" r:id="rId4"/>
     <p:sldId id="261" r:id="rId5"/>
     <p:sldId id="262" r:id="rId6"/>
-    <p:sldId id="263" r:id="rId7"/>
-    <p:sldId id="264" r:id="rId8"/>
-    <p:sldId id="266" r:id="rId9"/>
-    <p:sldId id="265" r:id="rId10"/>
-    <p:sldId id="267" r:id="rId11"/>
-    <p:sldId id="268" r:id="rId12"/>
-    <p:sldId id="258" r:id="rId13"/>
+    <p:sldId id="269" r:id="rId7"/>
+    <p:sldId id="263" r:id="rId8"/>
+    <p:sldId id="264" r:id="rId9"/>
+    <p:sldId id="266" r:id="rId10"/>
+    <p:sldId id="270" r:id="rId11"/>
+    <p:sldId id="265" r:id="rId12"/>
+    <p:sldId id="267" r:id="rId13"/>
+    <p:sldId id="268" r:id="rId14"/>
+    <p:sldId id="258" r:id="rId15"/>
   </p:sldIdLst>
   <p:sldSz cx="12192000" cy="6858000"/>
   <p:notesSz cx="6858000" cy="9144000"/>
@@ -115,6 +117,11 @@
       </a:defRPr>
     </a:lvl9pPr>
   </p:defaultTextStyle>
+  <p:extLst>
+    <p:ext uri="{EFAFB233-063F-42B5-8137-9DF3F51BA10A}">
+      <p15:sldGuideLst xmlns:p15="http://schemas.microsoft.com/office/powerpoint/2012/main"/>
+    </p:ext>
+  </p:extLst>
 </p:presentation>
 </file>
 
@@ -3310,7 +3317,7 @@
           <a:p>
             <a:fld id="{AE3425CA-4B9D-4420-BB9E-C250DB30E421}" type="datetime1">
               <a:rPr lang="en-US" smtClean="0"/>
-              <a:t>10/28/2021</a:t>
+              <a:t>10/29/2021</a:t>
             </a:fld>
             <a:endParaRPr lang="en-US"/>
           </a:p>
@@ -3518,7 +3525,7 @@
           <a:p>
             <a:fld id="{6A14B861-3779-4E37-8DF0-E9EB3EA96210}" type="datetime1">
               <a:rPr lang="en-US" smtClean="0"/>
-              <a:t>10/28/2021</a:t>
+              <a:t>10/29/2021</a:t>
             </a:fld>
             <a:endParaRPr lang="en-US"/>
           </a:p>
@@ -3776,7 +3783,7 @@
           <a:p>
             <a:fld id="{53E38388-E864-4553-9937-AE9FC5E50CFC}" type="datetime1">
               <a:rPr lang="en-US" smtClean="0"/>
-              <a:t>10/28/2021</a:t>
+              <a:t>10/29/2021</a:t>
             </a:fld>
             <a:endParaRPr lang="en-US"/>
           </a:p>
@@ -3946,7 +3953,7 @@
           <a:p>
             <a:fld id="{62751E1E-C50D-4FD4-8B1E-ECD78340D9AB}" type="datetime1">
               <a:rPr lang="en-US" smtClean="0"/>
-              <a:t>10/28/2021</a:t>
+              <a:t>10/29/2021</a:t>
             </a:fld>
             <a:endParaRPr lang="en-US"/>
           </a:p>
@@ -4283,7 +4290,7 @@
           <a:p>
             <a:fld id="{43C83AFB-9E54-459E-8C6D-0913AC3BA5D7}" type="datetime1">
               <a:rPr lang="en-US" smtClean="0"/>
-              <a:t>10/28/2021</a:t>
+              <a:t>10/29/2021</a:t>
             </a:fld>
             <a:endParaRPr lang="en-US"/>
           </a:p>
@@ -4558,7 +4565,7 @@
           <a:p>
             <a:fld id="{F10144B6-0CA7-46BA-A00B-1E68E5C3ED0C}" type="datetime1">
               <a:rPr lang="en-US" smtClean="0"/>
-              <a:t>10/28/2021</a:t>
+              <a:t>10/29/2021</a:t>
             </a:fld>
             <a:endParaRPr lang="en-US"/>
           </a:p>
@@ -4937,7 +4944,7 @@
           <a:p>
             <a:fld id="{0051F549-537C-41EC-B9CC-5B6A9AC2A6A7}" type="datetime1">
               <a:rPr lang="en-US" smtClean="0"/>
-              <a:t>10/28/2021</a:t>
+              <a:t>10/29/2021</a:t>
             </a:fld>
             <a:endParaRPr lang="en-US"/>
           </a:p>
@@ -5055,7 +5062,7 @@
           <a:p>
             <a:fld id="{952F8D56-3D0E-48B8-8218-1F3A06A96C62}" type="datetime1">
               <a:rPr lang="en-US" smtClean="0"/>
-              <a:t>10/28/2021</a:t>
+              <a:t>10/29/2021</a:t>
             </a:fld>
             <a:endParaRPr lang="en-US"/>
           </a:p>
@@ -5228,7 +5235,7 @@
           <a:p>
             <a:fld id="{E8EC309E-27D4-401F-A74A-DEA16C7B51DC}" type="datetime1">
               <a:rPr lang="en-US" smtClean="0"/>
-              <a:t>10/28/2021</a:t>
+              <a:t>10/29/2021</a:t>
             </a:fld>
             <a:endParaRPr lang="en-US"/>
           </a:p>
@@ -5584,7 +5591,7 @@
           <a:p>
             <a:fld id="{6DEA2B81-2BC3-42D7-B67D-05C685AA80AD}" type="datetime1">
               <a:rPr lang="en-US" smtClean="0"/>
-              <a:t>10/28/2021</a:t>
+              <a:t>10/29/2021</a:t>
             </a:fld>
             <a:endParaRPr lang="en-US"/>
           </a:p>
@@ -5963,7 +5970,7 @@
           <a:p>
             <a:fld id="{F0DB8F2B-E487-4905-B553-FB649F2B6F23}" type="datetime1">
               <a:rPr lang="en-US" smtClean="0"/>
-              <a:t>10/28/2021</a:t>
+              <a:t>10/29/2021</a:t>
             </a:fld>
             <a:endParaRPr lang="en-US"/>
           </a:p>
@@ -6252,7 +6259,7 @@
           <a:p>
             <a:fld id="{6EF7C3A7-D6F6-4D38-A7C3-B72967BB81A6}" type="datetime1">
               <a:rPr lang="en-US" smtClean="0"/>
-              <a:t>10/28/2021</a:t>
+              <a:t>10/29/2021</a:t>
             </a:fld>
             <a:endParaRPr lang="en-US"/>
           </a:p>
@@ -7021,6 +7028,968 @@
                 </a:effectLst>
                 <a:latin typeface="Roboto" panose="02000000000000000000" pitchFamily="2" charset="0"/>
               </a:rPr>
+              <a:t>Statistica</a:t>
+            </a:r>
+            <a:r>
+              <a:rPr lang="en-GB" dirty="0">
+                <a:solidFill>
+                  <a:srgbClr val="333333"/>
+                </a:solidFill>
+                <a:effectLst>
+                  <a:outerShdw blurRad="38100" dist="38100" dir="2700000" algn="tl">
+                    <a:srgbClr val="000000">
+                      <a:alpha val="43137"/>
+                    </a:srgbClr>
+                  </a:outerShdw>
+                </a:effectLst>
+                <a:latin typeface="Roboto" panose="02000000000000000000" pitchFamily="2" charset="0"/>
+              </a:rPr>
+              <a:t>l</a:t>
+            </a:r>
+          </a:p>
+          <a:p>
+            <a:pPr algn="l"/>
+            <a:r>
+              <a:rPr lang="en-GB" b="0" i="0" dirty="0">
+                <a:solidFill>
+                  <a:srgbClr val="333333"/>
+                </a:solidFill>
+                <a:effectLst>
+                  <a:outerShdw blurRad="38100" dist="38100" dir="2700000" algn="tl">
+                    <a:srgbClr val="000000">
+                      <a:alpha val="43137"/>
+                    </a:srgbClr>
+                  </a:outerShdw>
+                </a:effectLst>
+                <a:latin typeface="Roboto" panose="02000000000000000000" pitchFamily="2" charset="0"/>
+              </a:rPr>
+              <a:t>Models:</a:t>
+            </a:r>
+          </a:p>
+          <a:p>
+            <a:pPr algn="l"/>
+            <a:r>
+              <a:rPr lang="en-GB" b="0" i="0" dirty="0">
+                <a:solidFill>
+                  <a:srgbClr val="333333"/>
+                </a:solidFill>
+                <a:effectLst>
+                  <a:outerShdw blurRad="38100" dist="38100" dir="2700000" algn="tl">
+                    <a:srgbClr val="000000">
+                      <a:alpha val="43137"/>
+                    </a:srgbClr>
+                  </a:outerShdw>
+                </a:effectLst>
+                <a:latin typeface="Roboto" panose="02000000000000000000" pitchFamily="2" charset="0"/>
+              </a:rPr>
+              <a:t>Bag of Words</a:t>
+            </a:r>
+          </a:p>
+          <a:p>
+            <a:pPr algn="l"/>
+            <a:endParaRPr lang="en-GB" dirty="0">
+              <a:solidFill>
+                <a:srgbClr val="333333"/>
+              </a:solidFill>
+              <a:effectLst>
+                <a:outerShdw blurRad="38100" dist="38100" dir="2700000" algn="tl">
+                  <a:srgbClr val="000000">
+                    <a:alpha val="43137"/>
+                  </a:srgbClr>
+                </a:outerShdw>
+              </a:effectLst>
+              <a:latin typeface="Roboto" panose="02000000000000000000" pitchFamily="2" charset="0"/>
+            </a:endParaRPr>
+          </a:p>
+          <a:p>
+            <a:r>
+              <a:rPr lang="en-GB" sz="1400" dirty="0">
+                <a:latin typeface="charter"/>
+              </a:rPr>
+              <a:t>Takes into account  N tokens occurring in a sequence.</a:t>
+            </a:r>
+          </a:p>
+        </p:txBody>
+      </p:sp>
+      <p:cxnSp>
+        <p:nvCxnSpPr>
+          <p:cNvPr id="21" name="Straight Connector 20">
+            <a:extLst>
+              <a:ext uri="{FF2B5EF4-FFF2-40B4-BE49-F238E27FC236}">
+                <a16:creationId xmlns:a16="http://schemas.microsoft.com/office/drawing/2014/main" id="{734E3982-3388-4F3C-A9F0-3767D781F423}"/>
+              </a:ext>
+            </a:extLst>
+          </p:cNvPr>
+          <p:cNvCxnSpPr>
+            <a:cxnSpLocks/>
+          </p:cNvCxnSpPr>
+          <p:nvPr/>
+        </p:nvCxnSpPr>
+        <p:spPr>
+          <a:xfrm>
+            <a:off x="4585938" y="1477420"/>
+            <a:ext cx="0" cy="3752426"/>
+          </a:xfrm>
+          <a:prstGeom prst="line">
+            <a:avLst/>
+          </a:prstGeom>
+        </p:spPr>
+        <p:style>
+          <a:lnRef idx="3">
+            <a:schemeClr val="dk1"/>
+          </a:lnRef>
+          <a:fillRef idx="0">
+            <a:schemeClr val="dk1"/>
+          </a:fillRef>
+          <a:effectRef idx="2">
+            <a:schemeClr val="dk1"/>
+          </a:effectRef>
+          <a:fontRef idx="minor">
+            <a:schemeClr val="tx1"/>
+          </a:fontRef>
+        </p:style>
+      </p:cxnSp>
+      <p:sp>
+        <p:nvSpPr>
+          <p:cNvPr id="37" name="TextBox 36">
+            <a:extLst>
+              <a:ext uri="{FF2B5EF4-FFF2-40B4-BE49-F238E27FC236}">
+                <a16:creationId xmlns:a16="http://schemas.microsoft.com/office/drawing/2014/main" id="{24DEDCC1-3825-4829-8F4C-D7E3EA1E3ED9}"/>
+              </a:ext>
+            </a:extLst>
+          </p:cNvPr>
+          <p:cNvSpPr txBox="1"/>
+          <p:nvPr/>
+        </p:nvSpPr>
+        <p:spPr>
+          <a:xfrm>
+            <a:off x="9028853" y="6427892"/>
+            <a:ext cx="3542454" cy="307777"/>
+          </a:xfrm>
+          <a:prstGeom prst="rect">
+            <a:avLst/>
+          </a:prstGeom>
+          <a:noFill/>
+        </p:spPr>
+        <p:txBody>
+          <a:bodyPr wrap="square">
+            <a:spAutoFit/>
+          </a:bodyPr>
+          <a:lstStyle/>
+          <a:p>
+            <a:r>
+              <a:rPr lang="en-GB" sz="1400" dirty="0">
+                <a:solidFill>
+                  <a:schemeClr val="bg1"/>
+                </a:solidFill>
+              </a:rPr>
+              <a:t>PyData Global Conference 2021</a:t>
+            </a:r>
+          </a:p>
+        </p:txBody>
+      </p:sp>
+      <p:pic>
+        <p:nvPicPr>
+          <p:cNvPr id="7" name="Picture 2" descr="What exactly is an n Gram? - Stack Overflow">
+            <a:extLst>
+              <a:ext uri="{FF2B5EF4-FFF2-40B4-BE49-F238E27FC236}">
+                <a16:creationId xmlns:a16="http://schemas.microsoft.com/office/drawing/2014/main" id="{7CF68433-0800-4930-9CA4-8FF87ABEDB0A}"/>
+              </a:ext>
+            </a:extLst>
+          </p:cNvPr>
+          <p:cNvPicPr>
+            <a:picLocks noChangeAspect="1" noChangeArrowheads="1"/>
+          </p:cNvPicPr>
+          <p:nvPr/>
+        </p:nvPicPr>
+        <p:blipFill>
+          <a:blip r:embed="rId2">
+            <a:extLst>
+              <a:ext uri="{28A0092B-C50C-407E-A947-70E740481C1C}">
+                <a14:useLocalDpi xmlns:a14="http://schemas.microsoft.com/office/drawing/2010/main" val="0"/>
+              </a:ext>
+            </a:extLst>
+          </a:blip>
+          <a:srcRect/>
+          <a:stretch>
+            <a:fillRect/>
+          </a:stretch>
+        </p:blipFill>
+        <p:spPr bwMode="auto">
+          <a:xfrm>
+            <a:off x="5458481" y="2051036"/>
+            <a:ext cx="5638627" cy="2320356"/>
+          </a:xfrm>
+          <a:prstGeom prst="rect">
+            <a:avLst/>
+          </a:prstGeom>
+          <a:noFill/>
+          <a:extLst>
+            <a:ext uri="{909E8E84-426E-40DD-AFC4-6F175D3DCCD1}">
+              <a14:hiddenFill xmlns:a14="http://schemas.microsoft.com/office/drawing/2010/main">
+                <a:solidFill>
+                  <a:srgbClr val="FFFFFF"/>
+                </a:solidFill>
+              </a14:hiddenFill>
+            </a:ext>
+          </a:extLst>
+        </p:spPr>
+      </p:pic>
+      <p:sp>
+        <p:nvSpPr>
+          <p:cNvPr id="9" name="TextBox 8">
+            <a:extLst>
+              <a:ext uri="{FF2B5EF4-FFF2-40B4-BE49-F238E27FC236}">
+                <a16:creationId xmlns:a16="http://schemas.microsoft.com/office/drawing/2014/main" id="{1EE88249-71F3-40C3-96F1-9518F9296713}"/>
+              </a:ext>
+            </a:extLst>
+          </p:cNvPr>
+          <p:cNvSpPr txBox="1"/>
+          <p:nvPr/>
+        </p:nvSpPr>
+        <p:spPr>
+          <a:xfrm>
+            <a:off x="2839339" y="5981616"/>
+            <a:ext cx="6513322" cy="600164"/>
+          </a:xfrm>
+          <a:prstGeom prst="rect">
+            <a:avLst/>
+          </a:prstGeom>
+          <a:noFill/>
+        </p:spPr>
+        <p:txBody>
+          <a:bodyPr wrap="none" rtlCol="0">
+            <a:spAutoFit/>
+          </a:bodyPr>
+          <a:lstStyle/>
+          <a:p>
+            <a:r>
+              <a:rPr lang="en-GB" sz="1100" dirty="0"/>
+              <a:t>Image ref: </a:t>
+            </a:r>
+            <a:r>
+              <a:rPr lang="en-GB" sz="1100" dirty="0">
+                <a:hlinkClick r:id="rId3"/>
+              </a:rPr>
+              <a:t>http://rstudio-pubs-static.s3.amazonaws.com/460514_4377b4f645a944d788ae7300782123f3.html</a:t>
+            </a:r>
+            <a:endParaRPr lang="en-GB" sz="1100" dirty="0"/>
+          </a:p>
+          <a:p>
+            <a:endParaRPr lang="en-GB" sz="1100" b="0" i="0" u="sng" dirty="0">
+              <a:effectLst/>
+              <a:latin typeface="sohne"/>
+            </a:endParaRPr>
+          </a:p>
+          <a:p>
+            <a:endParaRPr lang="en-GB" sz="1100" dirty="0"/>
+          </a:p>
+        </p:txBody>
+      </p:sp>
+    </p:spTree>
+    <p:extLst>
+      <p:ext uri="{BB962C8B-B14F-4D97-AF65-F5344CB8AC3E}">
+        <p14:creationId xmlns:p14="http://schemas.microsoft.com/office/powerpoint/2010/main" val="3716893202"/>
+      </p:ext>
+    </p:extLst>
+  </p:cSld>
+  <p:clrMapOvr>
+    <a:masterClrMapping/>
+  </p:clrMapOvr>
+</p:sld>
+</file>
+
+<file path=ppt/slides/slide11.xml><?xml version="1.0" encoding="utf-8"?>
+<p:sld xmlns:a="http://schemas.openxmlformats.org/drawingml/2006/main" xmlns:r="http://schemas.openxmlformats.org/officeDocument/2006/relationships" xmlns:p="http://schemas.openxmlformats.org/presentationml/2006/main">
+  <p:cSld>
+    <p:bg>
+      <p:bgPr>
+        <a:solidFill>
+          <a:schemeClr val="bg1"/>
+        </a:solidFill>
+        <a:effectLst/>
+      </p:bgPr>
+    </p:bg>
+    <p:spTree>
+      <p:nvGrpSpPr>
+        <p:cNvPr id="1" name=""/>
+        <p:cNvGrpSpPr/>
+        <p:nvPr/>
+      </p:nvGrpSpPr>
+      <p:grpSpPr>
+        <a:xfrm>
+          <a:off x="0" y="0"/>
+          <a:ext cx="0" cy="0"/>
+          <a:chOff x="0" y="0"/>
+          <a:chExt cx="0" cy="0"/>
+        </a:xfrm>
+      </p:grpSpPr>
+      <p:sp>
+        <p:nvSpPr>
+          <p:cNvPr id="19" name="Title 1">
+            <a:extLst>
+              <a:ext uri="{FF2B5EF4-FFF2-40B4-BE49-F238E27FC236}">
+                <a16:creationId xmlns:a16="http://schemas.microsoft.com/office/drawing/2014/main" id="{9113B47E-F47D-4456-A486-2388D5E38C5F}"/>
+              </a:ext>
+            </a:extLst>
+          </p:cNvPr>
+          <p:cNvSpPr txBox="1">
+            <a:spLocks/>
+          </p:cNvSpPr>
+          <p:nvPr/>
+        </p:nvSpPr>
+        <p:spPr>
+          <a:xfrm>
+            <a:off x="403271" y="1477420"/>
+            <a:ext cx="3951981" cy="3851126"/>
+          </a:xfrm>
+          <a:prstGeom prst="rect">
+            <a:avLst/>
+          </a:prstGeom>
+        </p:spPr>
+        <p:txBody>
+          <a:bodyPr>
+            <a:normAutofit/>
+          </a:bodyPr>
+          <a:lstStyle>
+            <a:lvl1pPr algn="l" defTabSz="914400" rtl="0" eaLnBrk="1" latinLnBrk="0" hangingPunct="1">
+              <a:lnSpc>
+                <a:spcPct val="90000"/>
+              </a:lnSpc>
+              <a:spcBef>
+                <a:spcPct val="0"/>
+              </a:spcBef>
+              <a:buNone/>
+              <a:defRPr sz="4400" kern="1200">
+                <a:solidFill>
+                  <a:schemeClr val="tx1"/>
+                </a:solidFill>
+                <a:latin typeface="+mj-lt"/>
+                <a:ea typeface="+mj-ea"/>
+                <a:cs typeface="+mj-cs"/>
+              </a:defRPr>
+            </a:lvl1pPr>
+          </a:lstStyle>
+          <a:p>
+            <a:pPr algn="l"/>
+            <a:r>
+              <a:rPr lang="en-GB" b="0" i="0" dirty="0">
+                <a:solidFill>
+                  <a:srgbClr val="333333"/>
+                </a:solidFill>
+                <a:effectLst>
+                  <a:outerShdw blurRad="38100" dist="38100" dir="2700000" algn="tl">
+                    <a:srgbClr val="000000">
+                      <a:alpha val="43137"/>
+                    </a:srgbClr>
+                  </a:outerShdw>
+                </a:effectLst>
+                <a:latin typeface="Roboto" panose="02000000000000000000" pitchFamily="2" charset="0"/>
+              </a:rPr>
+              <a:t>Statistica</a:t>
+            </a:r>
+            <a:r>
+              <a:rPr lang="en-GB" dirty="0">
+                <a:solidFill>
+                  <a:srgbClr val="333333"/>
+                </a:solidFill>
+                <a:effectLst>
+                  <a:outerShdw blurRad="38100" dist="38100" dir="2700000" algn="tl">
+                    <a:srgbClr val="000000">
+                      <a:alpha val="43137"/>
+                    </a:srgbClr>
+                  </a:outerShdw>
+                </a:effectLst>
+                <a:latin typeface="Roboto" panose="02000000000000000000" pitchFamily="2" charset="0"/>
+              </a:rPr>
+              <a:t>l</a:t>
+            </a:r>
+          </a:p>
+          <a:p>
+            <a:pPr algn="l"/>
+            <a:r>
+              <a:rPr lang="en-GB" b="0" i="0" dirty="0">
+                <a:solidFill>
+                  <a:srgbClr val="333333"/>
+                </a:solidFill>
+                <a:effectLst>
+                  <a:outerShdw blurRad="38100" dist="38100" dir="2700000" algn="tl">
+                    <a:srgbClr val="000000">
+                      <a:alpha val="43137"/>
+                    </a:srgbClr>
+                  </a:outerShdw>
+                </a:effectLst>
+                <a:latin typeface="Roboto" panose="02000000000000000000" pitchFamily="2" charset="0"/>
+              </a:rPr>
+              <a:t>Models:</a:t>
+            </a:r>
+          </a:p>
+          <a:p>
+            <a:pPr algn="l"/>
+            <a:r>
+              <a:rPr lang="en-GB" b="0" i="0" dirty="0">
+                <a:solidFill>
+                  <a:srgbClr val="333333"/>
+                </a:solidFill>
+                <a:effectLst>
+                  <a:outerShdw blurRad="38100" dist="38100" dir="2700000" algn="tl">
+                    <a:srgbClr val="000000">
+                      <a:alpha val="43137"/>
+                    </a:srgbClr>
+                  </a:outerShdw>
+                </a:effectLst>
+                <a:latin typeface="Roboto" panose="02000000000000000000" pitchFamily="2" charset="0"/>
+              </a:rPr>
+              <a:t>TF-IDF</a:t>
+            </a:r>
+          </a:p>
+          <a:p>
+            <a:pPr algn="l"/>
+            <a:endParaRPr lang="en-GB" dirty="0">
+              <a:solidFill>
+                <a:srgbClr val="333333"/>
+              </a:solidFill>
+              <a:effectLst>
+                <a:outerShdw blurRad="38100" dist="38100" dir="2700000" algn="tl">
+                  <a:srgbClr val="000000">
+                    <a:alpha val="43137"/>
+                  </a:srgbClr>
+                </a:outerShdw>
+              </a:effectLst>
+              <a:latin typeface="Roboto" panose="02000000000000000000" pitchFamily="2" charset="0"/>
+            </a:endParaRPr>
+          </a:p>
+          <a:p>
+            <a:r>
+              <a:rPr lang="en-GB" sz="1400" dirty="0">
+                <a:solidFill>
+                  <a:srgbClr val="292929"/>
+                </a:solidFill>
+                <a:latin typeface="charter"/>
+              </a:rPr>
+              <a:t>Documents are converted to vector models (or vectorized form) using the number of the times a token appears in </a:t>
+            </a:r>
+            <a:r>
+              <a:rPr lang="en-GB" sz="1400" b="1" dirty="0">
+                <a:solidFill>
+                  <a:srgbClr val="292929"/>
+                </a:solidFill>
+                <a:latin typeface="charter"/>
+              </a:rPr>
+              <a:t>one</a:t>
+            </a:r>
+            <a:r>
+              <a:rPr lang="en-GB" sz="1400" dirty="0">
+                <a:solidFill>
+                  <a:srgbClr val="292929"/>
+                </a:solidFill>
+                <a:latin typeface="charter"/>
+              </a:rPr>
+              <a:t> document and in </a:t>
+            </a:r>
+            <a:r>
+              <a:rPr lang="en-GB" sz="1400" b="1" dirty="0">
+                <a:solidFill>
+                  <a:srgbClr val="292929"/>
+                </a:solidFill>
+                <a:latin typeface="charter"/>
+              </a:rPr>
+              <a:t>all</a:t>
+            </a:r>
+            <a:r>
+              <a:rPr lang="en-GB" sz="1400" dirty="0">
+                <a:solidFill>
+                  <a:srgbClr val="292929"/>
+                </a:solidFill>
+                <a:latin typeface="charter"/>
+              </a:rPr>
+              <a:t> the documents.</a:t>
+            </a:r>
+          </a:p>
+          <a:p>
+            <a:endParaRPr lang="en-GB" sz="1400" dirty="0">
+              <a:solidFill>
+                <a:srgbClr val="292929"/>
+              </a:solidFill>
+              <a:latin typeface="charter"/>
+            </a:endParaRPr>
+          </a:p>
+          <a:p>
+            <a:r>
+              <a:rPr lang="en-GB" sz="1400" dirty="0">
+                <a:solidFill>
+                  <a:srgbClr val="292929"/>
+                </a:solidFill>
+                <a:latin typeface="charter"/>
+              </a:rPr>
+              <a:t>Order is ignored.</a:t>
+            </a:r>
+          </a:p>
+          <a:p>
+            <a:endParaRPr lang="en-GB" sz="2000" dirty="0">
+              <a:solidFill>
+                <a:srgbClr val="292929"/>
+              </a:solidFill>
+              <a:latin typeface="charter"/>
+            </a:endParaRPr>
+          </a:p>
+        </p:txBody>
+      </p:sp>
+      <p:cxnSp>
+        <p:nvCxnSpPr>
+          <p:cNvPr id="21" name="Straight Connector 20">
+            <a:extLst>
+              <a:ext uri="{FF2B5EF4-FFF2-40B4-BE49-F238E27FC236}">
+                <a16:creationId xmlns:a16="http://schemas.microsoft.com/office/drawing/2014/main" id="{734E3982-3388-4F3C-A9F0-3767D781F423}"/>
+              </a:ext>
+            </a:extLst>
+          </p:cNvPr>
+          <p:cNvCxnSpPr>
+            <a:cxnSpLocks/>
+          </p:cNvCxnSpPr>
+          <p:nvPr/>
+        </p:nvCxnSpPr>
+        <p:spPr>
+          <a:xfrm>
+            <a:off x="4585938" y="1477420"/>
+            <a:ext cx="0" cy="3752426"/>
+          </a:xfrm>
+          <a:prstGeom prst="line">
+            <a:avLst/>
+          </a:prstGeom>
+        </p:spPr>
+        <p:style>
+          <a:lnRef idx="3">
+            <a:schemeClr val="dk1"/>
+          </a:lnRef>
+          <a:fillRef idx="0">
+            <a:schemeClr val="dk1"/>
+          </a:fillRef>
+          <a:effectRef idx="2">
+            <a:schemeClr val="dk1"/>
+          </a:effectRef>
+          <a:fontRef idx="minor">
+            <a:schemeClr val="tx1"/>
+          </a:fontRef>
+        </p:style>
+      </p:cxnSp>
+      <p:sp>
+        <p:nvSpPr>
+          <p:cNvPr id="37" name="TextBox 36">
+            <a:extLst>
+              <a:ext uri="{FF2B5EF4-FFF2-40B4-BE49-F238E27FC236}">
+                <a16:creationId xmlns:a16="http://schemas.microsoft.com/office/drawing/2014/main" id="{24DEDCC1-3825-4829-8F4C-D7E3EA1E3ED9}"/>
+              </a:ext>
+            </a:extLst>
+          </p:cNvPr>
+          <p:cNvSpPr txBox="1"/>
+          <p:nvPr/>
+        </p:nvSpPr>
+        <p:spPr>
+          <a:xfrm>
+            <a:off x="9028853" y="6427892"/>
+            <a:ext cx="3542454" cy="307777"/>
+          </a:xfrm>
+          <a:prstGeom prst="rect">
+            <a:avLst/>
+          </a:prstGeom>
+          <a:noFill/>
+        </p:spPr>
+        <p:txBody>
+          <a:bodyPr wrap="square">
+            <a:spAutoFit/>
+          </a:bodyPr>
+          <a:lstStyle/>
+          <a:p>
+            <a:r>
+              <a:rPr lang="en-GB" sz="1400" dirty="0">
+                <a:solidFill>
+                  <a:schemeClr val="bg1"/>
+                </a:solidFill>
+              </a:rPr>
+              <a:t>PyData Global Conference 2021</a:t>
+            </a:r>
+          </a:p>
+        </p:txBody>
+      </p:sp>
+      <p:pic>
+        <p:nvPicPr>
+          <p:cNvPr id="7" name="Picture 2" descr="Demystify TF-IDF in Indexing and Ranking | by Ted Mei | Medium">
+            <a:extLst>
+              <a:ext uri="{FF2B5EF4-FFF2-40B4-BE49-F238E27FC236}">
+                <a16:creationId xmlns:a16="http://schemas.microsoft.com/office/drawing/2014/main" id="{8E1C3AC8-80F7-4BC1-A761-DFB8AEBAF604}"/>
+              </a:ext>
+            </a:extLst>
+          </p:cNvPr>
+          <p:cNvPicPr>
+            <a:picLocks noChangeAspect="1" noChangeArrowheads="1"/>
+          </p:cNvPicPr>
+          <p:nvPr/>
+        </p:nvPicPr>
+        <p:blipFill>
+          <a:blip r:embed="rId2">
+            <a:extLst>
+              <a:ext uri="{28A0092B-C50C-407E-A947-70E740481C1C}">
+                <a14:useLocalDpi xmlns:a14="http://schemas.microsoft.com/office/drawing/2010/main" val="0"/>
+              </a:ext>
+            </a:extLst>
+          </a:blip>
+          <a:srcRect/>
+          <a:stretch>
+            <a:fillRect/>
+          </a:stretch>
+        </p:blipFill>
+        <p:spPr bwMode="auto">
+          <a:xfrm>
+            <a:off x="4159643" y="1759089"/>
+            <a:ext cx="6436519" cy="2142154"/>
+          </a:xfrm>
+          <a:prstGeom prst="rect">
+            <a:avLst/>
+          </a:prstGeom>
+          <a:noFill/>
+          <a:extLst>
+            <a:ext uri="{909E8E84-426E-40DD-AFC4-6F175D3DCCD1}">
+              <a14:hiddenFill xmlns:a14="http://schemas.microsoft.com/office/drawing/2010/main">
+                <a:solidFill>
+                  <a:srgbClr val="FFFFFF"/>
+                </a:solidFill>
+              </a14:hiddenFill>
+            </a:ext>
+          </a:extLst>
+        </p:spPr>
+      </p:pic>
+      <p:sp>
+        <p:nvSpPr>
+          <p:cNvPr id="8" name="TextBox 7">
+            <a:extLst>
+              <a:ext uri="{FF2B5EF4-FFF2-40B4-BE49-F238E27FC236}">
+                <a16:creationId xmlns:a16="http://schemas.microsoft.com/office/drawing/2014/main" id="{7F752978-1726-46AC-9BEA-B026803EA586}"/>
+              </a:ext>
+            </a:extLst>
+          </p:cNvPr>
+          <p:cNvSpPr txBox="1"/>
+          <p:nvPr/>
+        </p:nvSpPr>
+        <p:spPr>
+          <a:xfrm>
+            <a:off x="3535370" y="5997005"/>
+            <a:ext cx="5761514" cy="430887"/>
+          </a:xfrm>
+          <a:prstGeom prst="rect">
+            <a:avLst/>
+          </a:prstGeom>
+          <a:noFill/>
+        </p:spPr>
+        <p:txBody>
+          <a:bodyPr wrap="none" rtlCol="0">
+            <a:spAutoFit/>
+          </a:bodyPr>
+          <a:lstStyle/>
+          <a:p>
+            <a:r>
+              <a:rPr lang="en-GB" sz="1100" dirty="0"/>
+              <a:t>Image ref: </a:t>
+            </a:r>
+            <a:r>
+              <a:rPr lang="en-GB" sz="1100" b="0" i="0" u="sng" dirty="0">
+                <a:effectLst/>
+                <a:latin typeface="sohne"/>
+                <a:hlinkClick r:id="rId3"/>
+              </a:rPr>
+              <a:t>http://filotechnologia.blogspot.com/2014/01/a-simple-java-class-for-tfidf-scoring.html</a:t>
+            </a:r>
+            <a:endParaRPr lang="en-GB" sz="1100" b="0" i="0" u="sng" dirty="0">
+              <a:effectLst/>
+              <a:latin typeface="sohne"/>
+            </a:endParaRPr>
+          </a:p>
+          <a:p>
+            <a:endParaRPr lang="en-GB" sz="1100" dirty="0"/>
+          </a:p>
+        </p:txBody>
+      </p:sp>
+      <p:sp>
+        <p:nvSpPr>
+          <p:cNvPr id="9" name="Rectangle 8">
+            <a:extLst>
+              <a:ext uri="{FF2B5EF4-FFF2-40B4-BE49-F238E27FC236}">
+                <a16:creationId xmlns:a16="http://schemas.microsoft.com/office/drawing/2014/main" id="{B5FA1B9E-0030-4DDE-8BB3-2A33F2C23C85}"/>
+              </a:ext>
+            </a:extLst>
+          </p:cNvPr>
+          <p:cNvSpPr/>
+          <p:nvPr/>
+        </p:nvSpPr>
+        <p:spPr>
+          <a:xfrm>
+            <a:off x="9800425" y="528554"/>
+            <a:ext cx="1591474" cy="1019103"/>
+          </a:xfrm>
+          <a:prstGeom prst="rect">
+            <a:avLst/>
+          </a:prstGeom>
+        </p:spPr>
+        <p:style>
+          <a:lnRef idx="1">
+            <a:schemeClr val="accent4"/>
+          </a:lnRef>
+          <a:fillRef idx="3">
+            <a:schemeClr val="accent4"/>
+          </a:fillRef>
+          <a:effectRef idx="2">
+            <a:schemeClr val="accent4"/>
+          </a:effectRef>
+          <a:fontRef idx="minor">
+            <a:schemeClr val="lt1"/>
+          </a:fontRef>
+        </p:style>
+        <p:txBody>
+          <a:bodyPr rtlCol="0" anchor="ctr"/>
+          <a:lstStyle/>
+          <a:p>
+            <a:pPr algn="ctr"/>
+            <a:r>
+              <a:rPr lang="en-GB" sz="1400" b="1" dirty="0"/>
+              <a:t>Use log to dampen the effect of large corpus</a:t>
+            </a:r>
+          </a:p>
+        </p:txBody>
+      </p:sp>
+      <p:sp>
+        <p:nvSpPr>
+          <p:cNvPr id="10" name="Rectangle 9">
+            <a:extLst>
+              <a:ext uri="{FF2B5EF4-FFF2-40B4-BE49-F238E27FC236}">
+                <a16:creationId xmlns:a16="http://schemas.microsoft.com/office/drawing/2014/main" id="{28772741-9328-4AA7-B34C-6D2CA5F77E95}"/>
+              </a:ext>
+            </a:extLst>
+          </p:cNvPr>
+          <p:cNvSpPr/>
+          <p:nvPr/>
+        </p:nvSpPr>
+        <p:spPr>
+          <a:xfrm>
+            <a:off x="9028853" y="4235971"/>
+            <a:ext cx="2315485" cy="1225713"/>
+          </a:xfrm>
+          <a:prstGeom prst="rect">
+            <a:avLst/>
+          </a:prstGeom>
+        </p:spPr>
+        <p:style>
+          <a:lnRef idx="1">
+            <a:schemeClr val="accent4"/>
+          </a:lnRef>
+          <a:fillRef idx="3">
+            <a:schemeClr val="accent4"/>
+          </a:fillRef>
+          <a:effectRef idx="2">
+            <a:schemeClr val="accent4"/>
+          </a:effectRef>
+          <a:fontRef idx="minor">
+            <a:schemeClr val="lt1"/>
+          </a:fontRef>
+        </p:style>
+        <p:txBody>
+          <a:bodyPr rtlCol="0" anchor="ctr"/>
+          <a:lstStyle/>
+          <a:p>
+            <a:pPr algn="ctr"/>
+            <a:r>
+              <a:rPr lang="en-GB" sz="1400" b="1" dirty="0"/>
+              <a:t>(df+1) is used instead for terms that do not occur in the vocabulary to avoid Zero Division. </a:t>
+            </a:r>
+          </a:p>
+        </p:txBody>
+      </p:sp>
+      <p:cxnSp>
+        <p:nvCxnSpPr>
+          <p:cNvPr id="11" name="Connector: Curved 10">
+            <a:extLst>
+              <a:ext uri="{FF2B5EF4-FFF2-40B4-BE49-F238E27FC236}">
+                <a16:creationId xmlns:a16="http://schemas.microsoft.com/office/drawing/2014/main" id="{96C4ADEB-BE32-4944-8CF9-24D2C3CED32E}"/>
+              </a:ext>
+            </a:extLst>
+          </p:cNvPr>
+          <p:cNvCxnSpPr>
+            <a:cxnSpLocks/>
+            <a:stCxn id="9" idx="1"/>
+          </p:cNvCxnSpPr>
+          <p:nvPr/>
+        </p:nvCxnSpPr>
+        <p:spPr>
+          <a:xfrm rot="10800000" flipV="1">
+            <a:off x="8263467" y="1038105"/>
+            <a:ext cx="1536958" cy="720983"/>
+          </a:xfrm>
+          <a:prstGeom prst="curvedConnector3">
+            <a:avLst>
+              <a:gd name="adj1" fmla="val 98917"/>
+            </a:avLst>
+          </a:prstGeom>
+          <a:ln>
+            <a:tailEnd type="triangle"/>
+          </a:ln>
+        </p:spPr>
+        <p:style>
+          <a:lnRef idx="1">
+            <a:schemeClr val="accent1"/>
+          </a:lnRef>
+          <a:fillRef idx="0">
+            <a:schemeClr val="accent1"/>
+          </a:fillRef>
+          <a:effectRef idx="0">
+            <a:schemeClr val="accent1"/>
+          </a:effectRef>
+          <a:fontRef idx="minor">
+            <a:schemeClr val="tx1"/>
+          </a:fontRef>
+        </p:style>
+      </p:cxnSp>
+      <p:cxnSp>
+        <p:nvCxnSpPr>
+          <p:cNvPr id="15" name="Connector: Curved 14">
+            <a:extLst>
+              <a:ext uri="{FF2B5EF4-FFF2-40B4-BE49-F238E27FC236}">
+                <a16:creationId xmlns:a16="http://schemas.microsoft.com/office/drawing/2014/main" id="{2AF50005-D6C2-41B9-B760-58AB22ABA959}"/>
+              </a:ext>
+            </a:extLst>
+          </p:cNvPr>
+          <p:cNvCxnSpPr>
+            <a:cxnSpLocks/>
+          </p:cNvCxnSpPr>
+          <p:nvPr/>
+        </p:nvCxnSpPr>
+        <p:spPr>
+          <a:xfrm rot="16200000" flipV="1">
+            <a:off x="9412445" y="2999193"/>
+            <a:ext cx="1186208" cy="1181231"/>
+          </a:xfrm>
+          <a:prstGeom prst="curvedConnector3">
+            <a:avLst>
+              <a:gd name="adj1" fmla="val 81405"/>
+            </a:avLst>
+          </a:prstGeom>
+          <a:ln>
+            <a:tailEnd type="triangle"/>
+          </a:ln>
+        </p:spPr>
+        <p:style>
+          <a:lnRef idx="1">
+            <a:schemeClr val="accent1"/>
+          </a:lnRef>
+          <a:fillRef idx="0">
+            <a:schemeClr val="accent1"/>
+          </a:fillRef>
+          <a:effectRef idx="0">
+            <a:schemeClr val="accent1"/>
+          </a:effectRef>
+          <a:fontRef idx="minor">
+            <a:schemeClr val="tx1"/>
+          </a:fontRef>
+        </p:style>
+      </p:cxnSp>
+    </p:spTree>
+    <p:extLst>
+      <p:ext uri="{BB962C8B-B14F-4D97-AF65-F5344CB8AC3E}">
+        <p14:creationId xmlns:p14="http://schemas.microsoft.com/office/powerpoint/2010/main" val="315408164"/>
+      </p:ext>
+    </p:extLst>
+  </p:cSld>
+  <p:clrMapOvr>
+    <a:masterClrMapping/>
+  </p:clrMapOvr>
+</p:sld>
+</file>
+
+<file path=ppt/slides/slide12.xml><?xml version="1.0" encoding="utf-8"?>
+<p:sld xmlns:a="http://schemas.openxmlformats.org/drawingml/2006/main" xmlns:r="http://schemas.openxmlformats.org/officeDocument/2006/relationships" xmlns:p="http://schemas.openxmlformats.org/presentationml/2006/main">
+  <p:cSld>
+    <p:bg>
+      <p:bgPr>
+        <a:solidFill>
+          <a:schemeClr val="bg1"/>
+        </a:solidFill>
+        <a:effectLst/>
+      </p:bgPr>
+    </p:bg>
+    <p:spTree>
+      <p:nvGrpSpPr>
+        <p:cNvPr id="1" name=""/>
+        <p:cNvGrpSpPr/>
+        <p:nvPr/>
+      </p:nvGrpSpPr>
+      <p:grpSpPr>
+        <a:xfrm>
+          <a:off x="0" y="0"/>
+          <a:ext cx="0" cy="0"/>
+          <a:chOff x="0" y="0"/>
+          <a:chExt cx="0" cy="0"/>
+        </a:xfrm>
+      </p:grpSpPr>
+      <p:sp>
+        <p:nvSpPr>
+          <p:cNvPr id="19" name="Title 1">
+            <a:extLst>
+              <a:ext uri="{FF2B5EF4-FFF2-40B4-BE49-F238E27FC236}">
+                <a16:creationId xmlns:a16="http://schemas.microsoft.com/office/drawing/2014/main" id="{9113B47E-F47D-4456-A486-2388D5E38C5F}"/>
+              </a:ext>
+            </a:extLst>
+          </p:cNvPr>
+          <p:cNvSpPr txBox="1">
+            <a:spLocks/>
+          </p:cNvSpPr>
+          <p:nvPr/>
+        </p:nvSpPr>
+        <p:spPr>
+          <a:xfrm>
+            <a:off x="403271" y="1477420"/>
+            <a:ext cx="3951981" cy="3851126"/>
+          </a:xfrm>
+          <a:prstGeom prst="rect">
+            <a:avLst/>
+          </a:prstGeom>
+        </p:spPr>
+        <p:txBody>
+          <a:bodyPr>
+            <a:normAutofit/>
+          </a:bodyPr>
+          <a:lstStyle>
+            <a:lvl1pPr algn="l" defTabSz="914400" rtl="0" eaLnBrk="1" latinLnBrk="0" hangingPunct="1">
+              <a:lnSpc>
+                <a:spcPct val="90000"/>
+              </a:lnSpc>
+              <a:spcBef>
+                <a:spcPct val="0"/>
+              </a:spcBef>
+              <a:buNone/>
+              <a:defRPr sz="4400" kern="1200">
+                <a:solidFill>
+                  <a:schemeClr val="tx1"/>
+                </a:solidFill>
+                <a:latin typeface="+mj-lt"/>
+                <a:ea typeface="+mj-ea"/>
+                <a:cs typeface="+mj-cs"/>
+              </a:defRPr>
+            </a:lvl1pPr>
+          </a:lstStyle>
+          <a:p>
+            <a:pPr algn="l"/>
+            <a:r>
+              <a:rPr lang="en-GB" b="0" i="0" dirty="0">
+                <a:solidFill>
+                  <a:srgbClr val="333333"/>
+                </a:solidFill>
+                <a:effectLst>
+                  <a:outerShdw blurRad="38100" dist="38100" dir="2700000" algn="tl">
+                    <a:srgbClr val="000000">
+                      <a:alpha val="43137"/>
+                    </a:srgbClr>
+                  </a:outerShdw>
+                </a:effectLst>
+                <a:latin typeface="Roboto" panose="02000000000000000000" pitchFamily="2" charset="0"/>
+              </a:rPr>
               <a:t>Model Evaluation </a:t>
             </a:r>
           </a:p>
@@ -7214,7 +8183,7 @@
 </p:sld>
 </file>
 
-<file path=ppt/slides/slide11.xml><?xml version="1.0" encoding="utf-8"?>
+<file path=ppt/slides/slide13.xml><?xml version="1.0" encoding="utf-8"?>
 <p:sld xmlns:a="http://schemas.openxmlformats.org/drawingml/2006/main" xmlns:r="http://schemas.openxmlformats.org/officeDocument/2006/relationships" xmlns:p="http://schemas.openxmlformats.org/presentationml/2006/main">
   <p:cSld>
     <p:bg>
@@ -7719,7 +8688,7 @@
 </p:sld>
 </file>
 
-<file path=ppt/slides/slide12.xml><?xml version="1.0" encoding="utf-8"?>
+<file path=ppt/slides/slide14.xml><?xml version="1.0" encoding="utf-8"?>
 <p:sld xmlns:a="http://schemas.openxmlformats.org/drawingml/2006/main" xmlns:r="http://schemas.openxmlformats.org/officeDocument/2006/relationships" xmlns:p="http://schemas.openxmlformats.org/presentationml/2006/main">
   <p:cSld>
     <p:spTree>
@@ -9198,6 +10167,519 @@
         </p:nvSpPr>
         <p:spPr>
           <a:xfrm>
+            <a:off x="565330" y="1695888"/>
+            <a:ext cx="3572669" cy="3466224"/>
+          </a:xfrm>
+          <a:prstGeom prst="rect">
+            <a:avLst/>
+          </a:prstGeom>
+        </p:spPr>
+        <p:txBody>
+          <a:bodyPr>
+            <a:normAutofit lnSpcReduction="10000"/>
+          </a:bodyPr>
+          <a:lstStyle>
+            <a:lvl1pPr algn="l" defTabSz="914400" rtl="0" eaLnBrk="1" latinLnBrk="0" hangingPunct="1">
+              <a:lnSpc>
+                <a:spcPct val="90000"/>
+              </a:lnSpc>
+              <a:spcBef>
+                <a:spcPct val="0"/>
+              </a:spcBef>
+              <a:buNone/>
+              <a:defRPr sz="4400" kern="1200">
+                <a:solidFill>
+                  <a:schemeClr val="tx1"/>
+                </a:solidFill>
+                <a:latin typeface="+mj-lt"/>
+                <a:ea typeface="+mj-ea"/>
+                <a:cs typeface="+mj-cs"/>
+              </a:defRPr>
+            </a:lvl1pPr>
+          </a:lstStyle>
+          <a:p>
+            <a:pPr algn="l"/>
+            <a:r>
+              <a:rPr lang="en-GB" b="0" i="0" dirty="0">
+                <a:solidFill>
+                  <a:srgbClr val="333333"/>
+                </a:solidFill>
+                <a:effectLst>
+                  <a:outerShdw blurRad="38100" dist="38100" dir="2700000" algn="tl">
+                    <a:srgbClr val="000000">
+                      <a:alpha val="43137"/>
+                    </a:srgbClr>
+                  </a:outerShdw>
+                </a:effectLst>
+                <a:latin typeface="Roboto" panose="02000000000000000000" pitchFamily="2" charset="0"/>
+              </a:rPr>
+              <a:t>Text Classification</a:t>
+            </a:r>
+          </a:p>
+          <a:p>
+            <a:pPr algn="l"/>
+            <a:r>
+              <a:rPr lang="en-GB" dirty="0">
+                <a:solidFill>
+                  <a:srgbClr val="333333"/>
+                </a:solidFill>
+                <a:effectLst>
+                  <a:outerShdw blurRad="38100" dist="38100" dir="2700000" algn="tl">
+                    <a:srgbClr val="000000">
+                      <a:alpha val="43137"/>
+                    </a:srgbClr>
+                  </a:outerShdw>
+                </a:effectLst>
+                <a:latin typeface="Roboto" panose="02000000000000000000" pitchFamily="2" charset="0"/>
+              </a:rPr>
+              <a:t>Using </a:t>
+            </a:r>
+          </a:p>
+          <a:p>
+            <a:pPr algn="l"/>
+            <a:r>
+              <a:rPr lang="en-GB" b="0" i="0" dirty="0">
+                <a:solidFill>
+                  <a:srgbClr val="333333"/>
+                </a:solidFill>
+                <a:effectLst>
+                  <a:outerShdw blurRad="38100" dist="38100" dir="2700000" algn="tl">
+                    <a:srgbClr val="000000">
+                      <a:alpha val="43137"/>
+                    </a:srgbClr>
+                  </a:outerShdw>
+                </a:effectLst>
+                <a:latin typeface="Roboto" panose="02000000000000000000" pitchFamily="2" charset="0"/>
+              </a:rPr>
+              <a:t>Supervised</a:t>
+            </a:r>
+          </a:p>
+          <a:p>
+            <a:pPr algn="l"/>
+            <a:r>
+              <a:rPr lang="en-GB" dirty="0">
+                <a:solidFill>
+                  <a:srgbClr val="333333"/>
+                </a:solidFill>
+                <a:effectLst>
+                  <a:outerShdw blurRad="38100" dist="38100" dir="2700000" algn="tl">
+                    <a:srgbClr val="000000">
+                      <a:alpha val="43137"/>
+                    </a:srgbClr>
+                  </a:outerShdw>
+                </a:effectLst>
+                <a:latin typeface="Roboto" panose="02000000000000000000" pitchFamily="2" charset="0"/>
+              </a:rPr>
+              <a:t>Machine Learning</a:t>
+            </a:r>
+            <a:endParaRPr lang="en-GB" b="0" i="0" dirty="0">
+              <a:solidFill>
+                <a:srgbClr val="333333"/>
+              </a:solidFill>
+              <a:effectLst>
+                <a:outerShdw blurRad="38100" dist="38100" dir="2700000" algn="tl">
+                  <a:srgbClr val="000000">
+                    <a:alpha val="43137"/>
+                  </a:srgbClr>
+                </a:outerShdw>
+              </a:effectLst>
+              <a:latin typeface="Roboto" panose="02000000000000000000" pitchFamily="2" charset="0"/>
+            </a:endParaRPr>
+          </a:p>
+        </p:txBody>
+      </p:sp>
+      <p:cxnSp>
+        <p:nvCxnSpPr>
+          <p:cNvPr id="21" name="Straight Connector 20">
+            <a:extLst>
+              <a:ext uri="{FF2B5EF4-FFF2-40B4-BE49-F238E27FC236}">
+                <a16:creationId xmlns:a16="http://schemas.microsoft.com/office/drawing/2014/main" id="{734E3982-3388-4F3C-A9F0-3767D781F423}"/>
+              </a:ext>
+            </a:extLst>
+          </p:cNvPr>
+          <p:cNvCxnSpPr>
+            <a:cxnSpLocks/>
+          </p:cNvCxnSpPr>
+          <p:nvPr/>
+        </p:nvCxnSpPr>
+        <p:spPr>
+          <a:xfrm>
+            <a:off x="4369191" y="1409686"/>
+            <a:ext cx="0" cy="3752426"/>
+          </a:xfrm>
+          <a:prstGeom prst="line">
+            <a:avLst/>
+          </a:prstGeom>
+        </p:spPr>
+        <p:style>
+          <a:lnRef idx="3">
+            <a:schemeClr val="dk1"/>
+          </a:lnRef>
+          <a:fillRef idx="0">
+            <a:schemeClr val="dk1"/>
+          </a:fillRef>
+          <a:effectRef idx="2">
+            <a:schemeClr val="dk1"/>
+          </a:effectRef>
+          <a:fontRef idx="minor">
+            <a:schemeClr val="tx1"/>
+          </a:fontRef>
+        </p:style>
+      </p:cxnSp>
+      <p:sp>
+        <p:nvSpPr>
+          <p:cNvPr id="37" name="TextBox 36">
+            <a:extLst>
+              <a:ext uri="{FF2B5EF4-FFF2-40B4-BE49-F238E27FC236}">
+                <a16:creationId xmlns:a16="http://schemas.microsoft.com/office/drawing/2014/main" id="{24DEDCC1-3825-4829-8F4C-D7E3EA1E3ED9}"/>
+              </a:ext>
+            </a:extLst>
+          </p:cNvPr>
+          <p:cNvSpPr txBox="1"/>
+          <p:nvPr/>
+        </p:nvSpPr>
+        <p:spPr>
+          <a:xfrm>
+            <a:off x="9028853" y="6427892"/>
+            <a:ext cx="3542454" cy="307777"/>
+          </a:xfrm>
+          <a:prstGeom prst="rect">
+            <a:avLst/>
+          </a:prstGeom>
+          <a:noFill/>
+        </p:spPr>
+        <p:txBody>
+          <a:bodyPr wrap="square">
+            <a:spAutoFit/>
+          </a:bodyPr>
+          <a:lstStyle/>
+          <a:p>
+            <a:r>
+              <a:rPr lang="en-GB" sz="1400" dirty="0">
+                <a:solidFill>
+                  <a:schemeClr val="bg1"/>
+                </a:solidFill>
+              </a:rPr>
+              <a:t>PyData Global Conference 2021</a:t>
+            </a:r>
+          </a:p>
+        </p:txBody>
+      </p:sp>
+      <p:sp>
+        <p:nvSpPr>
+          <p:cNvPr id="6" name="Subtitle 2">
+            <a:extLst>
+              <a:ext uri="{FF2B5EF4-FFF2-40B4-BE49-F238E27FC236}">
+                <a16:creationId xmlns:a16="http://schemas.microsoft.com/office/drawing/2014/main" id="{2DEF4A47-1610-49B0-A626-10500582FD07}"/>
+              </a:ext>
+            </a:extLst>
+          </p:cNvPr>
+          <p:cNvSpPr txBox="1">
+            <a:spLocks/>
+          </p:cNvSpPr>
+          <p:nvPr/>
+        </p:nvSpPr>
+        <p:spPr>
+          <a:xfrm>
+            <a:off x="4953496" y="1765314"/>
+            <a:ext cx="5982467" cy="3327372"/>
+          </a:xfrm>
+          <a:prstGeom prst="rect">
+            <a:avLst/>
+          </a:prstGeom>
+        </p:spPr>
+        <p:txBody>
+          <a:bodyPr anchor="t">
+            <a:normAutofit fontScale="85000" lnSpcReduction="10000"/>
+          </a:bodyPr>
+          <a:lstStyle>
+            <a:lvl1pPr marL="228600" indent="-228600" algn="l" defTabSz="914400" rtl="0" eaLnBrk="1" latinLnBrk="0" hangingPunct="1">
+              <a:lnSpc>
+                <a:spcPct val="90000"/>
+              </a:lnSpc>
+              <a:spcBef>
+                <a:spcPts val="1000"/>
+              </a:spcBef>
+              <a:buFont typeface="Arial" panose="020B0604020202020204" pitchFamily="34" charset="0"/>
+              <a:buChar char="•"/>
+              <a:defRPr sz="2800" kern="1200">
+                <a:solidFill>
+                  <a:schemeClr val="tx1"/>
+                </a:solidFill>
+                <a:latin typeface="+mn-lt"/>
+                <a:ea typeface="+mn-ea"/>
+                <a:cs typeface="+mn-cs"/>
+              </a:defRPr>
+            </a:lvl1pPr>
+            <a:lvl2pPr marL="685800" indent="-228600" algn="l" defTabSz="914400" rtl="0" eaLnBrk="1" latinLnBrk="0" hangingPunct="1">
+              <a:lnSpc>
+                <a:spcPct val="90000"/>
+              </a:lnSpc>
+              <a:spcBef>
+                <a:spcPts val="500"/>
+              </a:spcBef>
+              <a:buFont typeface="Arial" panose="020B0604020202020204" pitchFamily="34" charset="0"/>
+              <a:buChar char="•"/>
+              <a:defRPr sz="2400" kern="1200">
+                <a:solidFill>
+                  <a:schemeClr val="tx1"/>
+                </a:solidFill>
+                <a:latin typeface="+mn-lt"/>
+                <a:ea typeface="+mn-ea"/>
+                <a:cs typeface="+mn-cs"/>
+              </a:defRPr>
+            </a:lvl2pPr>
+            <a:lvl3pPr marL="1143000" indent="-228600" algn="l" defTabSz="914400" rtl="0" eaLnBrk="1" latinLnBrk="0" hangingPunct="1">
+              <a:lnSpc>
+                <a:spcPct val="90000"/>
+              </a:lnSpc>
+              <a:spcBef>
+                <a:spcPts val="500"/>
+              </a:spcBef>
+              <a:buFont typeface="Arial" panose="020B0604020202020204" pitchFamily="34" charset="0"/>
+              <a:buChar char="•"/>
+              <a:defRPr sz="2000" kern="1200">
+                <a:solidFill>
+                  <a:schemeClr val="tx1"/>
+                </a:solidFill>
+                <a:latin typeface="+mn-lt"/>
+                <a:ea typeface="+mn-ea"/>
+                <a:cs typeface="+mn-cs"/>
+              </a:defRPr>
+            </a:lvl3pPr>
+            <a:lvl4pPr marL="1600200" indent="-228600" algn="l" defTabSz="914400" rtl="0" eaLnBrk="1" latinLnBrk="0" hangingPunct="1">
+              <a:lnSpc>
+                <a:spcPct val="90000"/>
+              </a:lnSpc>
+              <a:spcBef>
+                <a:spcPts val="500"/>
+              </a:spcBef>
+              <a:buFont typeface="Arial" panose="020B0604020202020204" pitchFamily="34" charset="0"/>
+              <a:buChar char="•"/>
+              <a:defRPr sz="1800" kern="1200">
+                <a:solidFill>
+                  <a:schemeClr val="tx1"/>
+                </a:solidFill>
+                <a:latin typeface="+mn-lt"/>
+                <a:ea typeface="+mn-ea"/>
+                <a:cs typeface="+mn-cs"/>
+              </a:defRPr>
+            </a:lvl4pPr>
+            <a:lvl5pPr marL="2057400" indent="-228600" algn="l" defTabSz="914400" rtl="0" eaLnBrk="1" latinLnBrk="0" hangingPunct="1">
+              <a:lnSpc>
+                <a:spcPct val="90000"/>
+              </a:lnSpc>
+              <a:spcBef>
+                <a:spcPts val="500"/>
+              </a:spcBef>
+              <a:buFont typeface="Arial" panose="020B0604020202020204" pitchFamily="34" charset="0"/>
+              <a:buChar char="•"/>
+              <a:defRPr sz="1800" kern="1200">
+                <a:solidFill>
+                  <a:schemeClr val="tx1"/>
+                </a:solidFill>
+                <a:latin typeface="+mn-lt"/>
+                <a:ea typeface="+mn-ea"/>
+                <a:cs typeface="+mn-cs"/>
+              </a:defRPr>
+            </a:lvl5pPr>
+            <a:lvl6pPr marL="2514600" indent="-228600" algn="l" defTabSz="914400" rtl="0" eaLnBrk="1" latinLnBrk="0" hangingPunct="1">
+              <a:lnSpc>
+                <a:spcPct val="90000"/>
+              </a:lnSpc>
+              <a:spcBef>
+                <a:spcPts val="500"/>
+              </a:spcBef>
+              <a:buFont typeface="Arial" panose="020B0604020202020204" pitchFamily="34" charset="0"/>
+              <a:buChar char="•"/>
+              <a:defRPr sz="1800" kern="1200">
+                <a:solidFill>
+                  <a:schemeClr val="tx1"/>
+                </a:solidFill>
+                <a:latin typeface="+mn-lt"/>
+                <a:ea typeface="+mn-ea"/>
+                <a:cs typeface="+mn-cs"/>
+              </a:defRPr>
+            </a:lvl6pPr>
+            <a:lvl7pPr marL="2971800" indent="-228600" algn="l" defTabSz="914400" rtl="0" eaLnBrk="1" latinLnBrk="0" hangingPunct="1">
+              <a:lnSpc>
+                <a:spcPct val="90000"/>
+              </a:lnSpc>
+              <a:spcBef>
+                <a:spcPts val="500"/>
+              </a:spcBef>
+              <a:buFont typeface="Arial" panose="020B0604020202020204" pitchFamily="34" charset="0"/>
+              <a:buChar char="•"/>
+              <a:defRPr sz="1800" kern="1200">
+                <a:solidFill>
+                  <a:schemeClr val="tx1"/>
+                </a:solidFill>
+                <a:latin typeface="+mn-lt"/>
+                <a:ea typeface="+mn-ea"/>
+                <a:cs typeface="+mn-cs"/>
+              </a:defRPr>
+            </a:lvl7pPr>
+            <a:lvl8pPr marL="3429000" indent="-228600" algn="l" defTabSz="914400" rtl="0" eaLnBrk="1" latinLnBrk="0" hangingPunct="1">
+              <a:lnSpc>
+                <a:spcPct val="90000"/>
+              </a:lnSpc>
+              <a:spcBef>
+                <a:spcPts val="500"/>
+              </a:spcBef>
+              <a:buFont typeface="Arial" panose="020B0604020202020204" pitchFamily="34" charset="0"/>
+              <a:buChar char="•"/>
+              <a:defRPr sz="1800" kern="1200">
+                <a:solidFill>
+                  <a:schemeClr val="tx1"/>
+                </a:solidFill>
+                <a:latin typeface="+mn-lt"/>
+                <a:ea typeface="+mn-ea"/>
+                <a:cs typeface="+mn-cs"/>
+              </a:defRPr>
+            </a:lvl8pPr>
+            <a:lvl9pPr marL="3886200" indent="-228600" algn="l" defTabSz="914400" rtl="0" eaLnBrk="1" latinLnBrk="0" hangingPunct="1">
+              <a:lnSpc>
+                <a:spcPct val="90000"/>
+              </a:lnSpc>
+              <a:spcBef>
+                <a:spcPts val="500"/>
+              </a:spcBef>
+              <a:buFont typeface="Arial" panose="020B0604020202020204" pitchFamily="34" charset="0"/>
+              <a:buChar char="•"/>
+              <a:defRPr sz="1800" kern="1200">
+                <a:solidFill>
+                  <a:schemeClr val="tx1"/>
+                </a:solidFill>
+                <a:latin typeface="+mn-lt"/>
+                <a:ea typeface="+mn-ea"/>
+                <a:cs typeface="+mn-cs"/>
+              </a:defRPr>
+            </a:lvl9pPr>
+          </a:lstStyle>
+          <a:p>
+            <a:pPr marL="0" indent="0">
+              <a:buNone/>
+            </a:pPr>
+            <a:r>
+              <a:rPr lang="en-GB" sz="2400" dirty="0"/>
+              <a:t>Assigning </a:t>
+            </a:r>
+            <a:r>
+              <a:rPr lang="en-GB" sz="2400" b="1" dirty="0"/>
+              <a:t>pre-defined </a:t>
+            </a:r>
+            <a:r>
+              <a:rPr lang="en-GB" sz="2400" dirty="0"/>
+              <a:t>categories to text documents.</a:t>
+            </a:r>
+          </a:p>
+          <a:p>
+            <a:pPr marL="0" indent="0">
+              <a:buNone/>
+            </a:pPr>
+            <a:r>
+              <a:rPr lang="en-GB" sz="2400" dirty="0"/>
+              <a:t>Target / Label is the term for the pre-defined categories.</a:t>
+            </a:r>
+          </a:p>
+          <a:p>
+            <a:pPr marL="0" indent="0">
+              <a:buNone/>
+            </a:pPr>
+            <a:endParaRPr lang="en-GB" sz="2400" dirty="0"/>
+          </a:p>
+          <a:p>
+            <a:pPr marL="0" indent="0">
+              <a:buNone/>
+            </a:pPr>
+            <a:r>
+              <a:rPr lang="en-GB" sz="2400" dirty="0"/>
+              <a:t>Example:</a:t>
+            </a:r>
+          </a:p>
+          <a:p>
+            <a:r>
+              <a:rPr lang="en-GB" sz="2400" dirty="0"/>
+              <a:t>Is an email spam?</a:t>
+            </a:r>
+          </a:p>
+          <a:p>
+            <a:r>
+              <a:rPr lang="en-GB" sz="2400" dirty="0"/>
+              <a:t>Is a news article about politics, business, or sports?</a:t>
+            </a:r>
+          </a:p>
+          <a:p>
+            <a:r>
+              <a:rPr lang="en-GB" sz="2400" dirty="0"/>
+              <a:t>Gender Identification</a:t>
+            </a:r>
+          </a:p>
+          <a:p>
+            <a:r>
+              <a:rPr lang="en-GB" sz="2400" dirty="0"/>
+              <a:t>Sentiment Analysis – If a review is positive or negative?</a:t>
+            </a:r>
+          </a:p>
+          <a:p>
+            <a:endParaRPr lang="en-GB" sz="2400" dirty="0"/>
+          </a:p>
+        </p:txBody>
+      </p:sp>
+    </p:spTree>
+    <p:extLst>
+      <p:ext uri="{BB962C8B-B14F-4D97-AF65-F5344CB8AC3E}">
+        <p14:creationId xmlns:p14="http://schemas.microsoft.com/office/powerpoint/2010/main" val="4274411235"/>
+      </p:ext>
+    </p:extLst>
+  </p:cSld>
+  <p:clrMapOvr>
+    <a:masterClrMapping/>
+  </p:clrMapOvr>
+</p:sld>
+</file>
+
+<file path=ppt/slides/slide6.xml><?xml version="1.0" encoding="utf-8"?>
+<p:sld xmlns:a="http://schemas.openxmlformats.org/drawingml/2006/main" xmlns:r="http://schemas.openxmlformats.org/officeDocument/2006/relationships" xmlns:p="http://schemas.openxmlformats.org/presentationml/2006/main">
+  <p:cSld>
+    <p:bg>
+      <p:bgPr>
+        <a:solidFill>
+          <a:schemeClr val="bg1"/>
+        </a:solidFill>
+        <a:effectLst/>
+      </p:bgPr>
+    </p:bg>
+    <p:spTree>
+      <p:nvGrpSpPr>
+        <p:cNvPr id="1" name=""/>
+        <p:cNvGrpSpPr/>
+        <p:nvPr/>
+      </p:nvGrpSpPr>
+      <p:grpSpPr>
+        <a:xfrm>
+          <a:off x="0" y="0"/>
+          <a:ext cx="0" cy="0"/>
+          <a:chOff x="0" y="0"/>
+          <a:chExt cx="0" cy="0"/>
+        </a:xfrm>
+      </p:grpSpPr>
+      <p:sp>
+        <p:nvSpPr>
+          <p:cNvPr id="19" name="Title 1">
+            <a:extLst>
+              <a:ext uri="{FF2B5EF4-FFF2-40B4-BE49-F238E27FC236}">
+                <a16:creationId xmlns:a16="http://schemas.microsoft.com/office/drawing/2014/main" id="{9113B47E-F47D-4456-A486-2388D5E38C5F}"/>
+              </a:ext>
+            </a:extLst>
+          </p:cNvPr>
+          <p:cNvSpPr txBox="1">
+            <a:spLocks/>
+          </p:cNvSpPr>
+          <p:nvPr/>
+        </p:nvSpPr>
+        <p:spPr>
+          <a:xfrm>
             <a:off x="721619" y="2190341"/>
             <a:ext cx="3085802" cy="3466224"/>
           </a:xfrm>
@@ -9619,7 +11101,7 @@
     </p:spTree>
     <p:extLst>
       <p:ext uri="{BB962C8B-B14F-4D97-AF65-F5344CB8AC3E}">
-        <p14:creationId xmlns:p14="http://schemas.microsoft.com/office/powerpoint/2010/main" val="4274411235"/>
+        <p14:creationId xmlns:p14="http://schemas.microsoft.com/office/powerpoint/2010/main" val="589964045"/>
       </p:ext>
     </p:extLst>
   </p:cSld>
@@ -9629,7 +11111,7 @@
 </p:sld>
 </file>
 
-<file path=ppt/slides/slide6.xml><?xml version="1.0" encoding="utf-8"?>
+<file path=ppt/slides/slide7.xml><?xml version="1.0" encoding="utf-8"?>
 <p:sld xmlns:a="http://schemas.openxmlformats.org/drawingml/2006/main" xmlns:r="http://schemas.openxmlformats.org/officeDocument/2006/relationships" xmlns:p="http://schemas.openxmlformats.org/presentationml/2006/main">
   <p:cSld>
     <p:bg>
@@ -10143,7 +11625,7 @@
 </p:sld>
 </file>
 
-<file path=ppt/slides/slide7.xml><?xml version="1.0" encoding="utf-8"?>
+<file path=ppt/slides/slide8.xml><?xml version="1.0" encoding="utf-8"?>
 <p:sld xmlns:a="http://schemas.openxmlformats.org/drawingml/2006/main" xmlns:r="http://schemas.openxmlformats.org/officeDocument/2006/relationships" xmlns:p="http://schemas.openxmlformats.org/presentationml/2006/main">
   <p:cSld>
     <p:bg>
@@ -10500,403 +11982,6 @@
     <p:extLst>
       <p:ext uri="{BB962C8B-B14F-4D97-AF65-F5344CB8AC3E}">
         <p14:creationId xmlns:p14="http://schemas.microsoft.com/office/powerpoint/2010/main" val="264108086"/>
-      </p:ext>
-    </p:extLst>
-  </p:cSld>
-  <p:clrMapOvr>
-    <a:masterClrMapping/>
-  </p:clrMapOvr>
-</p:sld>
-</file>
-
-<file path=ppt/slides/slide8.xml><?xml version="1.0" encoding="utf-8"?>
-<p:sld xmlns:a="http://schemas.openxmlformats.org/drawingml/2006/main" xmlns:r="http://schemas.openxmlformats.org/officeDocument/2006/relationships" xmlns:p="http://schemas.openxmlformats.org/presentationml/2006/main">
-  <p:cSld>
-    <p:bg>
-      <p:bgPr>
-        <a:solidFill>
-          <a:schemeClr val="bg1"/>
-        </a:solidFill>
-        <a:effectLst/>
-      </p:bgPr>
-    </p:bg>
-    <p:spTree>
-      <p:nvGrpSpPr>
-        <p:cNvPr id="1" name=""/>
-        <p:cNvGrpSpPr/>
-        <p:nvPr/>
-      </p:nvGrpSpPr>
-      <p:grpSpPr>
-        <a:xfrm>
-          <a:off x="0" y="0"/>
-          <a:ext cx="0" cy="0"/>
-          <a:chOff x="0" y="0"/>
-          <a:chExt cx="0" cy="0"/>
-        </a:xfrm>
-      </p:grpSpPr>
-      <p:sp>
-        <p:nvSpPr>
-          <p:cNvPr id="19" name="Title 1">
-            <a:extLst>
-              <a:ext uri="{FF2B5EF4-FFF2-40B4-BE49-F238E27FC236}">
-                <a16:creationId xmlns:a16="http://schemas.microsoft.com/office/drawing/2014/main" id="{9113B47E-F47D-4456-A486-2388D5E38C5F}"/>
-              </a:ext>
-            </a:extLst>
-          </p:cNvPr>
-          <p:cNvSpPr txBox="1">
-            <a:spLocks/>
-          </p:cNvSpPr>
-          <p:nvPr/>
-        </p:nvSpPr>
-        <p:spPr>
-          <a:xfrm>
-            <a:off x="403271" y="1477420"/>
-            <a:ext cx="3951981" cy="3851126"/>
-          </a:xfrm>
-          <a:prstGeom prst="rect">
-            <a:avLst/>
-          </a:prstGeom>
-        </p:spPr>
-        <p:txBody>
-          <a:bodyPr>
-            <a:normAutofit/>
-          </a:bodyPr>
-          <a:lstStyle>
-            <a:lvl1pPr algn="l" defTabSz="914400" rtl="0" eaLnBrk="1" latinLnBrk="0" hangingPunct="1">
-              <a:lnSpc>
-                <a:spcPct val="90000"/>
-              </a:lnSpc>
-              <a:spcBef>
-                <a:spcPct val="0"/>
-              </a:spcBef>
-              <a:buNone/>
-              <a:defRPr sz="4400" kern="1200">
-                <a:solidFill>
-                  <a:schemeClr val="tx1"/>
-                </a:solidFill>
-                <a:latin typeface="+mj-lt"/>
-                <a:ea typeface="+mj-ea"/>
-                <a:cs typeface="+mj-cs"/>
-              </a:defRPr>
-            </a:lvl1pPr>
-          </a:lstStyle>
-          <a:p>
-            <a:pPr algn="l"/>
-            <a:r>
-              <a:rPr lang="en-GB" b="0" i="0" dirty="0">
-                <a:solidFill>
-                  <a:srgbClr val="333333"/>
-                </a:solidFill>
-                <a:effectLst>
-                  <a:outerShdw blurRad="38100" dist="38100" dir="2700000" algn="tl">
-                    <a:srgbClr val="000000">
-                      <a:alpha val="43137"/>
-                    </a:srgbClr>
-                  </a:outerShdw>
-                </a:effectLst>
-                <a:latin typeface="Roboto" panose="02000000000000000000" pitchFamily="2" charset="0"/>
-              </a:rPr>
-              <a:t>Statistica</a:t>
-            </a:r>
-            <a:r>
-              <a:rPr lang="en-GB" dirty="0">
-                <a:solidFill>
-                  <a:srgbClr val="333333"/>
-                </a:solidFill>
-                <a:effectLst>
-                  <a:outerShdw blurRad="38100" dist="38100" dir="2700000" algn="tl">
-                    <a:srgbClr val="000000">
-                      <a:alpha val="43137"/>
-                    </a:srgbClr>
-                  </a:outerShdw>
-                </a:effectLst>
-                <a:latin typeface="Roboto" panose="02000000000000000000" pitchFamily="2" charset="0"/>
-              </a:rPr>
-              <a:t>l</a:t>
-            </a:r>
-          </a:p>
-          <a:p>
-            <a:pPr algn="l"/>
-            <a:r>
-              <a:rPr lang="en-GB" b="0" i="0" dirty="0">
-                <a:solidFill>
-                  <a:srgbClr val="333333"/>
-                </a:solidFill>
-                <a:effectLst>
-                  <a:outerShdw blurRad="38100" dist="38100" dir="2700000" algn="tl">
-                    <a:srgbClr val="000000">
-                      <a:alpha val="43137"/>
-                    </a:srgbClr>
-                  </a:outerShdw>
-                </a:effectLst>
-                <a:latin typeface="Roboto" panose="02000000000000000000" pitchFamily="2" charset="0"/>
-              </a:rPr>
-              <a:t>Models:</a:t>
-            </a:r>
-          </a:p>
-          <a:p>
-            <a:pPr algn="l"/>
-            <a:r>
-              <a:rPr lang="en-GB" b="0" i="0" dirty="0">
-                <a:solidFill>
-                  <a:srgbClr val="333333"/>
-                </a:solidFill>
-                <a:effectLst>
-                  <a:outerShdw blurRad="38100" dist="38100" dir="2700000" algn="tl">
-                    <a:srgbClr val="000000">
-                      <a:alpha val="43137"/>
-                    </a:srgbClr>
-                  </a:outerShdw>
-                </a:effectLst>
-                <a:latin typeface="Roboto" panose="02000000000000000000" pitchFamily="2" charset="0"/>
-              </a:rPr>
-              <a:t>Bag of Words</a:t>
-            </a:r>
-          </a:p>
-          <a:p>
-            <a:pPr algn="l"/>
-            <a:endParaRPr lang="en-GB" dirty="0">
-              <a:solidFill>
-                <a:srgbClr val="333333"/>
-              </a:solidFill>
-              <a:effectLst>
-                <a:outerShdw blurRad="38100" dist="38100" dir="2700000" algn="tl">
-                  <a:srgbClr val="000000">
-                    <a:alpha val="43137"/>
-                  </a:srgbClr>
-                </a:outerShdw>
-              </a:effectLst>
-              <a:latin typeface="Roboto" panose="02000000000000000000" pitchFamily="2" charset="0"/>
-            </a:endParaRPr>
-          </a:p>
-          <a:p>
-            <a:r>
-              <a:rPr lang="en-GB" sz="1400" dirty="0">
-                <a:solidFill>
-                  <a:srgbClr val="292929"/>
-                </a:solidFill>
-                <a:latin typeface="charter"/>
-              </a:rPr>
-              <a:t>In a Bag of Words or </a:t>
-            </a:r>
-            <a:r>
-              <a:rPr lang="en-GB" sz="1400" dirty="0" err="1">
-                <a:solidFill>
-                  <a:srgbClr val="292929"/>
-                </a:solidFill>
-                <a:latin typeface="charter"/>
-              </a:rPr>
-              <a:t>BoW</a:t>
-            </a:r>
-            <a:r>
-              <a:rPr lang="en-GB" sz="1400" dirty="0">
-                <a:solidFill>
-                  <a:srgbClr val="292929"/>
-                </a:solidFill>
-                <a:latin typeface="charter"/>
-              </a:rPr>
-              <a:t>, bag refers to an unordered list of words which allows multiple occurrences of the words. </a:t>
-            </a:r>
-            <a:r>
-              <a:rPr lang="en-GB" sz="1400" dirty="0">
-                <a:solidFill>
-                  <a:srgbClr val="C00000"/>
-                </a:solidFill>
-                <a:latin typeface="charter"/>
-              </a:rPr>
-              <a:t>Position</a:t>
-            </a:r>
-            <a:r>
-              <a:rPr lang="en-GB" sz="1400" dirty="0">
-                <a:solidFill>
-                  <a:srgbClr val="292929"/>
-                </a:solidFill>
-                <a:latin typeface="charter"/>
-              </a:rPr>
-              <a:t> of the words is </a:t>
-            </a:r>
-            <a:r>
-              <a:rPr lang="en-GB" sz="1400" dirty="0">
-                <a:solidFill>
-                  <a:srgbClr val="C00000"/>
-                </a:solidFill>
-                <a:latin typeface="charter"/>
-              </a:rPr>
-              <a:t>ignored</a:t>
-            </a:r>
-            <a:r>
-              <a:rPr lang="en-GB" sz="1400" dirty="0">
-                <a:solidFill>
-                  <a:srgbClr val="292929"/>
-                </a:solidFill>
-                <a:latin typeface="charter"/>
-              </a:rPr>
-              <a:t> and </a:t>
-            </a:r>
-            <a:r>
-              <a:rPr lang="en-GB" sz="1400" dirty="0">
-                <a:solidFill>
-                  <a:srgbClr val="00B050"/>
-                </a:solidFill>
-                <a:latin typeface="charter"/>
-              </a:rPr>
-              <a:t>Frequency</a:t>
-            </a:r>
-            <a:r>
-              <a:rPr lang="en-GB" sz="1400" dirty="0">
-                <a:solidFill>
-                  <a:srgbClr val="292929"/>
-                </a:solidFill>
-                <a:latin typeface="charter"/>
-              </a:rPr>
-              <a:t> (the number of occurrences) of a token is </a:t>
-            </a:r>
-            <a:r>
-              <a:rPr lang="en-GB" sz="1400" dirty="0">
-                <a:solidFill>
-                  <a:srgbClr val="00B050"/>
-                </a:solidFill>
-                <a:latin typeface="charter"/>
-              </a:rPr>
-              <a:t>considered.</a:t>
-            </a:r>
-          </a:p>
-          <a:p>
-            <a:endParaRPr lang="en-GB" sz="2000" dirty="0">
-              <a:solidFill>
-                <a:srgbClr val="292929"/>
-              </a:solidFill>
-              <a:latin typeface="charter"/>
-            </a:endParaRPr>
-          </a:p>
-        </p:txBody>
-      </p:sp>
-      <p:cxnSp>
-        <p:nvCxnSpPr>
-          <p:cNvPr id="21" name="Straight Connector 20">
-            <a:extLst>
-              <a:ext uri="{FF2B5EF4-FFF2-40B4-BE49-F238E27FC236}">
-                <a16:creationId xmlns:a16="http://schemas.microsoft.com/office/drawing/2014/main" id="{734E3982-3388-4F3C-A9F0-3767D781F423}"/>
-              </a:ext>
-            </a:extLst>
-          </p:cNvPr>
-          <p:cNvCxnSpPr>
-            <a:cxnSpLocks/>
-          </p:cNvCxnSpPr>
-          <p:nvPr/>
-        </p:nvCxnSpPr>
-        <p:spPr>
-          <a:xfrm>
-            <a:off x="4585938" y="1477420"/>
-            <a:ext cx="0" cy="3752426"/>
-          </a:xfrm>
-          <a:prstGeom prst="line">
-            <a:avLst/>
-          </a:prstGeom>
-        </p:spPr>
-        <p:style>
-          <a:lnRef idx="3">
-            <a:schemeClr val="dk1"/>
-          </a:lnRef>
-          <a:fillRef idx="0">
-            <a:schemeClr val="dk1"/>
-          </a:fillRef>
-          <a:effectRef idx="2">
-            <a:schemeClr val="dk1"/>
-          </a:effectRef>
-          <a:fontRef idx="minor">
-            <a:schemeClr val="tx1"/>
-          </a:fontRef>
-        </p:style>
-      </p:cxnSp>
-      <p:sp>
-        <p:nvSpPr>
-          <p:cNvPr id="37" name="TextBox 36">
-            <a:extLst>
-              <a:ext uri="{FF2B5EF4-FFF2-40B4-BE49-F238E27FC236}">
-                <a16:creationId xmlns:a16="http://schemas.microsoft.com/office/drawing/2014/main" id="{24DEDCC1-3825-4829-8F4C-D7E3EA1E3ED9}"/>
-              </a:ext>
-            </a:extLst>
-          </p:cNvPr>
-          <p:cNvSpPr txBox="1"/>
-          <p:nvPr/>
-        </p:nvSpPr>
-        <p:spPr>
-          <a:xfrm>
-            <a:off x="9028853" y="6427892"/>
-            <a:ext cx="3542454" cy="307777"/>
-          </a:xfrm>
-          <a:prstGeom prst="rect">
-            <a:avLst/>
-          </a:prstGeom>
-          <a:noFill/>
-        </p:spPr>
-        <p:txBody>
-          <a:bodyPr wrap="square">
-            <a:spAutoFit/>
-          </a:bodyPr>
-          <a:lstStyle/>
-          <a:p>
-            <a:r>
-              <a:rPr lang="en-GB" sz="1400" dirty="0">
-                <a:solidFill>
-                  <a:schemeClr val="bg1"/>
-                </a:solidFill>
-              </a:rPr>
-              <a:t>PyData Global Conference 2021</a:t>
-            </a:r>
-          </a:p>
-        </p:txBody>
-      </p:sp>
-      <p:pic>
-        <p:nvPicPr>
-          <p:cNvPr id="6" name="Picture 2" descr="A Bag of Words: Levels of Language - SEP">
-            <a:extLst>
-              <a:ext uri="{FF2B5EF4-FFF2-40B4-BE49-F238E27FC236}">
-                <a16:creationId xmlns:a16="http://schemas.microsoft.com/office/drawing/2014/main" id="{941CD1BE-7A7A-4BD0-A63E-0863DB430A01}"/>
-              </a:ext>
-            </a:extLst>
-          </p:cNvPr>
-          <p:cNvPicPr>
-            <a:picLocks noChangeAspect="1" noChangeArrowheads="1"/>
-          </p:cNvPicPr>
-          <p:nvPr/>
-        </p:nvPicPr>
-        <p:blipFill rotWithShape="1">
-          <a:blip r:embed="rId2">
-            <a:extLst>
-              <a:ext uri="{28A0092B-C50C-407E-A947-70E740481C1C}">
-                <a14:useLocalDpi xmlns:a14="http://schemas.microsoft.com/office/drawing/2010/main" val="0"/>
-              </a:ext>
-            </a:extLst>
-          </a:blip>
-          <a:srcRect l="2551"/>
-          <a:stretch/>
-        </p:blipFill>
-        <p:spPr bwMode="auto">
-          <a:xfrm>
-            <a:off x="4945970" y="1378719"/>
-            <a:ext cx="6842759" cy="3949827"/>
-          </a:xfrm>
-          <a:prstGeom prst="rect">
-            <a:avLst/>
-          </a:prstGeom>
-          <a:noFill/>
-          <a:extLst>
-            <a:ext uri="{909E8E84-426E-40DD-AFC4-6F175D3DCCD1}">
-              <a14:hiddenFill xmlns:a14="http://schemas.microsoft.com/office/drawing/2010/main">
-                <a:solidFill>
-                  <a:srgbClr val="FFFFFF"/>
-                </a:solidFill>
-              </a14:hiddenFill>
-            </a:ext>
-          </a:extLst>
-        </p:spPr>
-      </p:pic>
-    </p:spTree>
-    <p:extLst>
-      <p:ext uri="{BB962C8B-B14F-4D97-AF65-F5344CB8AC3E}">
-        <p14:creationId xmlns:p14="http://schemas.microsoft.com/office/powerpoint/2010/main" val="2831381733"/>
       </p:ext>
     </p:extLst>
   </p:cSld>
@@ -11047,7 +12132,7 @@
                 </a:effectLst>
                 <a:latin typeface="Roboto" panose="02000000000000000000" pitchFamily="2" charset="0"/>
               </a:rPr>
-              <a:t>TF-IDF</a:t>
+              <a:t>Bag of Words</a:t>
             </a:r>
           </a:p>
           <a:p>
@@ -11074,16 +12159,16 @@
                 </a:solidFill>
                 <a:latin typeface="charter"/>
               </a:rPr>
-              <a:t>Documents are converted to vector models (or vectorized form) using the number of the times a token appears in </a:t>
-            </a:r>
-            <a:r>
-              <a:rPr lang="en-GB" sz="1400" b="1" dirty="0">
+              <a:t>In a Bag of Words or </a:t>
+            </a:r>
+            <a:r>
+              <a:rPr lang="en-GB" sz="1400" dirty="0" err="1">
                 <a:solidFill>
                   <a:srgbClr val="292929"/>
                 </a:solidFill>
                 <a:latin typeface="charter"/>
               </a:rPr>
-              <a:t>one</a:t>
+              <a:t>BoW</a:t>
             </a:r>
             <a:r>
               <a:rPr lang="en-GB" sz="1400" dirty="0">
@@ -11092,16 +12177,16 @@
                 </a:solidFill>
                 <a:latin typeface="charter"/>
               </a:rPr>
-              <a:t> document and in </a:t>
-            </a:r>
-            <a:r>
-              <a:rPr lang="en-GB" sz="1400" b="1" dirty="0">
-                <a:solidFill>
-                  <a:srgbClr val="292929"/>
+              <a:t>, bag refers to an unordered list of words which allows multiple occurrences of the words. </a:t>
+            </a:r>
+            <a:r>
+              <a:rPr lang="en-GB" sz="1400" dirty="0">
+                <a:solidFill>
+                  <a:srgbClr val="C00000"/>
                 </a:solidFill>
                 <a:latin typeface="charter"/>
               </a:rPr>
-              <a:t>all</a:t>
+              <a:t>Position</a:t>
             </a:r>
             <a:r>
               <a:rPr lang="en-GB" sz="1400" dirty="0">
@@ -11110,26 +12195,52 @@
                 </a:solidFill>
                 <a:latin typeface="charter"/>
               </a:rPr>
-              <a:t> the documents.</a:t>
-            </a:r>
-          </a:p>
-          <a:p>
-            <a:endParaRPr lang="en-GB" sz="1400" dirty="0">
-              <a:solidFill>
-                <a:srgbClr val="292929"/>
-              </a:solidFill>
-              <a:latin typeface="charter"/>
-            </a:endParaRPr>
-          </a:p>
-          <a:p>
+              <a:t> of the words is </a:t>
+            </a:r>
             <a:r>
               <a:rPr lang="en-GB" sz="1400" dirty="0">
                 <a:solidFill>
-                  <a:srgbClr val="292929"/>
+                  <a:srgbClr val="C00000"/>
                 </a:solidFill>
                 <a:latin typeface="charter"/>
               </a:rPr>
-              <a:t>Order is ignored.</a:t>
+              <a:t>ignored</a:t>
+            </a:r>
+            <a:r>
+              <a:rPr lang="en-GB" sz="1400" dirty="0">
+                <a:solidFill>
+                  <a:srgbClr val="292929"/>
+                </a:solidFill>
+                <a:latin typeface="charter"/>
+              </a:rPr>
+              <a:t> and </a:t>
+            </a:r>
+            <a:r>
+              <a:rPr lang="en-GB" sz="1400" dirty="0">
+                <a:solidFill>
+                  <a:srgbClr val="00B050"/>
+                </a:solidFill>
+                <a:latin typeface="charter"/>
+              </a:rPr>
+              <a:t>Frequency</a:t>
+            </a:r>
+            <a:r>
+              <a:rPr lang="en-GB" sz="1400" dirty="0">
+                <a:solidFill>
+                  <a:srgbClr val="292929"/>
+                </a:solidFill>
+                <a:latin typeface="charter"/>
+              </a:rPr>
+              <a:t> (the number of occurrences) of a token is </a:t>
+            </a:r>
+            <a:r>
+              <a:rPr lang="en-GB" sz="1400" dirty="0">
+                <a:solidFill>
+                  <a:srgbClr val="00B050"/>
+                </a:solidFill>
+                <a:latin typeface="charter"/>
+              </a:rPr>
+              <a:t>considered.</a:t>
             </a:r>
           </a:p>
           <a:p>
@@ -11221,10 +12332,10 @@
       </p:sp>
       <p:pic>
         <p:nvPicPr>
-          <p:cNvPr id="7" name="Picture 2" descr="Demystify TF-IDF in Indexing and Ranking | by Ted Mei | Medium">
+          <p:cNvPr id="6" name="Picture 2" descr="A Bag of Words: Levels of Language - SEP">
             <a:extLst>
               <a:ext uri="{FF2B5EF4-FFF2-40B4-BE49-F238E27FC236}">
-                <a16:creationId xmlns:a16="http://schemas.microsoft.com/office/drawing/2014/main" id="{8E1C3AC8-80F7-4BC1-A761-DFB8AEBAF604}"/>
+                <a16:creationId xmlns:a16="http://schemas.microsoft.com/office/drawing/2014/main" id="{941CD1BE-7A7A-4BD0-A63E-0863DB430A01}"/>
               </a:ext>
             </a:extLst>
           </p:cNvPr>
@@ -11233,7 +12344,7 @@
           </p:cNvPicPr>
           <p:nvPr/>
         </p:nvPicPr>
-        <p:blipFill>
+        <p:blipFill rotWithShape="1">
           <a:blip r:embed="rId2">
             <a:extLst>
               <a:ext uri="{28A0092B-C50C-407E-A947-70E740481C1C}">
@@ -11241,15 +12352,13 @@
               </a:ext>
             </a:extLst>
           </a:blip>
-          <a:srcRect/>
-          <a:stretch>
-            <a:fillRect/>
-          </a:stretch>
+          <a:srcRect l="2551"/>
+          <a:stretch/>
         </p:blipFill>
         <p:spPr bwMode="auto">
           <a:xfrm>
-            <a:off x="4159643" y="1759089"/>
-            <a:ext cx="6436519" cy="2142154"/>
+            <a:off x="4945970" y="1378719"/>
+            <a:ext cx="6842759" cy="3949827"/>
           </a:xfrm>
           <a:prstGeom prst="rect">
             <a:avLst/>
@@ -11271,7 +12380,7 @@
           <p:cNvPr id="8" name="TextBox 7">
             <a:extLst>
               <a:ext uri="{FF2B5EF4-FFF2-40B4-BE49-F238E27FC236}">
-                <a16:creationId xmlns:a16="http://schemas.microsoft.com/office/drawing/2014/main" id="{7F752978-1726-46AC-9BEA-B026803EA586}"/>
+                <a16:creationId xmlns:a16="http://schemas.microsoft.com/office/drawing/2014/main" id="{B2A215F9-007D-430D-9498-22ED33F6CDE7}"/>
               </a:ext>
             </a:extLst>
           </p:cNvPr>
@@ -11280,8 +12389,8 @@
         </p:nvSpPr>
         <p:spPr>
           <a:xfrm>
-            <a:off x="3535370" y="5997005"/>
-            <a:ext cx="5761514" cy="430887"/>
+            <a:off x="4049606" y="5934203"/>
+            <a:ext cx="4092787" cy="430887"/>
           </a:xfrm>
           <a:prstGeom prst="rect">
             <a:avLst/>
@@ -11299,15 +12408,12 @@
               <a:t>Image ref: </a:t>
             </a:r>
             <a:r>
-              <a:rPr lang="en-GB" sz="1100" b="0" i="0" u="sng" dirty="0">
-                <a:effectLst/>
-                <a:latin typeface="sohne"/>
+              <a:rPr lang="en-GB" sz="1100" dirty="0">
                 <a:hlinkClick r:id="rId3"/>
               </a:rPr>
-              <a:t>http://filotechnologia.blogspot.com/2014/01/a-simple-java-class-for-tfidf-scoring.html</a:t>
-            </a:r>
-            <a:endParaRPr lang="en-GB" sz="1100" b="0" i="0" u="sng" dirty="0">
-              <a:effectLst/>
+              <a:t>https://sep.com/blog/a-bag-of-words-levels-of-language/</a:t>
+            </a:r>
+            <a:endParaRPr lang="en-GB" sz="1100" u="sng" dirty="0">
               <a:latin typeface="sohne"/>
             </a:endParaRPr>
           </a:p>
@@ -11316,191 +12422,10 @@
           </a:p>
         </p:txBody>
       </p:sp>
-      <p:sp>
-        <p:nvSpPr>
-          <p:cNvPr id="9" name="Rectangle 8">
-            <a:extLst>
-              <a:ext uri="{FF2B5EF4-FFF2-40B4-BE49-F238E27FC236}">
-                <a16:creationId xmlns:a16="http://schemas.microsoft.com/office/drawing/2014/main" id="{B5FA1B9E-0030-4DDE-8BB3-2A33F2C23C85}"/>
-              </a:ext>
-            </a:extLst>
-          </p:cNvPr>
-          <p:cNvSpPr/>
-          <p:nvPr/>
-        </p:nvSpPr>
-        <p:spPr>
-          <a:xfrm>
-            <a:off x="9800425" y="528554"/>
-            <a:ext cx="1591474" cy="1019103"/>
-          </a:xfrm>
-          <a:prstGeom prst="rect">
-            <a:avLst/>
-          </a:prstGeom>
-        </p:spPr>
-        <p:style>
-          <a:lnRef idx="1">
-            <a:schemeClr val="accent4"/>
-          </a:lnRef>
-          <a:fillRef idx="3">
-            <a:schemeClr val="accent4"/>
-          </a:fillRef>
-          <a:effectRef idx="2">
-            <a:schemeClr val="accent4"/>
-          </a:effectRef>
-          <a:fontRef idx="minor">
-            <a:schemeClr val="lt1"/>
-          </a:fontRef>
-        </p:style>
-        <p:txBody>
-          <a:bodyPr rtlCol="0" anchor="ctr"/>
-          <a:lstStyle/>
-          <a:p>
-            <a:pPr algn="ctr"/>
-            <a:r>
-              <a:rPr lang="en-GB" sz="1400" b="1" dirty="0"/>
-              <a:t>Use log to dampen the effect of large corpus</a:t>
-            </a:r>
-          </a:p>
-        </p:txBody>
-      </p:sp>
-      <p:sp>
-        <p:nvSpPr>
-          <p:cNvPr id="10" name="Rectangle 9">
-            <a:extLst>
-              <a:ext uri="{FF2B5EF4-FFF2-40B4-BE49-F238E27FC236}">
-                <a16:creationId xmlns:a16="http://schemas.microsoft.com/office/drawing/2014/main" id="{28772741-9328-4AA7-B34C-6D2CA5F77E95}"/>
-              </a:ext>
-            </a:extLst>
-          </p:cNvPr>
-          <p:cNvSpPr/>
-          <p:nvPr/>
-        </p:nvSpPr>
-        <p:spPr>
-          <a:xfrm>
-            <a:off x="9028853" y="4235971"/>
-            <a:ext cx="2315485" cy="1225713"/>
-          </a:xfrm>
-          <a:prstGeom prst="rect">
-            <a:avLst/>
-          </a:prstGeom>
-        </p:spPr>
-        <p:style>
-          <a:lnRef idx="1">
-            <a:schemeClr val="accent4"/>
-          </a:lnRef>
-          <a:fillRef idx="3">
-            <a:schemeClr val="accent4"/>
-          </a:fillRef>
-          <a:effectRef idx="2">
-            <a:schemeClr val="accent4"/>
-          </a:effectRef>
-          <a:fontRef idx="minor">
-            <a:schemeClr val="lt1"/>
-          </a:fontRef>
-        </p:style>
-        <p:txBody>
-          <a:bodyPr rtlCol="0" anchor="ctr"/>
-          <a:lstStyle/>
-          <a:p>
-            <a:pPr algn="ctr"/>
-            <a:r>
-              <a:rPr lang="en-GB" sz="1400" b="1" dirty="0"/>
-              <a:t>(df+1) is used instead for terms that do not occur in the vocabulary to avoid Zero Division. </a:t>
-            </a:r>
-          </a:p>
-        </p:txBody>
-      </p:sp>
-      <p:cxnSp>
-        <p:nvCxnSpPr>
-          <p:cNvPr id="11" name="Connector: Curved 10">
-            <a:extLst>
-              <a:ext uri="{FF2B5EF4-FFF2-40B4-BE49-F238E27FC236}">
-                <a16:creationId xmlns:a16="http://schemas.microsoft.com/office/drawing/2014/main" id="{96C4ADEB-BE32-4944-8CF9-24D2C3CED32E}"/>
-              </a:ext>
-            </a:extLst>
-          </p:cNvPr>
-          <p:cNvCxnSpPr>
-            <a:cxnSpLocks/>
-            <a:stCxn id="9" idx="1"/>
-          </p:cNvCxnSpPr>
-          <p:nvPr/>
-        </p:nvCxnSpPr>
-        <p:spPr>
-          <a:xfrm rot="10800000" flipV="1">
-            <a:off x="8263467" y="1038105"/>
-            <a:ext cx="1536958" cy="720983"/>
-          </a:xfrm>
-          <a:prstGeom prst="curvedConnector3">
-            <a:avLst>
-              <a:gd name="adj1" fmla="val 98917"/>
-            </a:avLst>
-          </a:prstGeom>
-          <a:ln>
-            <a:tailEnd type="triangle"/>
-          </a:ln>
-        </p:spPr>
-        <p:style>
-          <a:lnRef idx="1">
-            <a:schemeClr val="accent1"/>
-          </a:lnRef>
-          <a:fillRef idx="0">
-            <a:schemeClr val="accent1"/>
-          </a:fillRef>
-          <a:effectRef idx="0">
-            <a:schemeClr val="accent1"/>
-          </a:effectRef>
-          <a:fontRef idx="minor">
-            <a:schemeClr val="tx1"/>
-          </a:fontRef>
-        </p:style>
-      </p:cxnSp>
-      <p:cxnSp>
-        <p:nvCxnSpPr>
-          <p:cNvPr id="15" name="Connector: Curved 14">
-            <a:extLst>
-              <a:ext uri="{FF2B5EF4-FFF2-40B4-BE49-F238E27FC236}">
-                <a16:creationId xmlns:a16="http://schemas.microsoft.com/office/drawing/2014/main" id="{2AF50005-D6C2-41B9-B760-58AB22ABA959}"/>
-              </a:ext>
-            </a:extLst>
-          </p:cNvPr>
-          <p:cNvCxnSpPr>
-            <a:cxnSpLocks/>
-          </p:cNvCxnSpPr>
-          <p:nvPr/>
-        </p:nvCxnSpPr>
-        <p:spPr>
-          <a:xfrm rot="16200000" flipV="1">
-            <a:off x="9412445" y="2999193"/>
-            <a:ext cx="1186208" cy="1181231"/>
-          </a:xfrm>
-          <a:prstGeom prst="curvedConnector3">
-            <a:avLst>
-              <a:gd name="adj1" fmla="val 81405"/>
-            </a:avLst>
-          </a:prstGeom>
-          <a:ln>
-            <a:tailEnd type="triangle"/>
-          </a:ln>
-        </p:spPr>
-        <p:style>
-          <a:lnRef idx="1">
-            <a:schemeClr val="accent1"/>
-          </a:lnRef>
-          <a:fillRef idx="0">
-            <a:schemeClr val="accent1"/>
-          </a:fillRef>
-          <a:effectRef idx="0">
-            <a:schemeClr val="accent1"/>
-          </a:effectRef>
-          <a:fontRef idx="minor">
-            <a:schemeClr val="tx1"/>
-          </a:fontRef>
-        </p:style>
-      </p:cxnSp>
     </p:spTree>
     <p:extLst>
       <p:ext uri="{BB962C8B-B14F-4D97-AF65-F5344CB8AC3E}">
-        <p14:creationId xmlns:p14="http://schemas.microsoft.com/office/powerpoint/2010/main" val="315408164"/>
+        <p14:creationId xmlns:p14="http://schemas.microsoft.com/office/powerpoint/2010/main" val="2831381733"/>
       </p:ext>
     </p:extLst>
   </p:cSld>

</xml_diff>